<commit_message>
Update IWP Review 1 -RECIPE FINDER.pptx
add
</commit_message>
<xml_diff>
--- a/IWP Review 1 -RECIPE FINDER.pptx
+++ b/IWP Review 1 -RECIPE FINDER.pptx
@@ -1,21 +1,21 @@
 
 <file path=ppt/presentation.xml><?xml version="1.0" encoding="utf-8"?>
-<p:presentation xmlns:a="http://schemas.openxmlformats.org/drawingml/2006/main" xmlns:r="http://schemas.openxmlformats.org/officeDocument/2006/relationships" xmlns:p="http://schemas.openxmlformats.org/presentationml/2006/main" saveSubsetFonts="1">
+<p:presentation xmlns:a="http://schemas.openxmlformats.org/drawingml/2006/main" xmlns:r="http://schemas.openxmlformats.org/officeDocument/2006/relationships" xmlns:p="http://schemas.openxmlformats.org/presentationml/2006/main">
   <p:sldMasterIdLst>
-    <p:sldMasterId id="2147484180" r:id="rId1"/>
+    <p:sldMasterId id="2147483648" r:id="rId1"/>
   </p:sldMasterIdLst>
   <p:sldIdLst>
-    <p:sldId id="257" r:id="rId2"/>
-    <p:sldId id="258" r:id="rId3"/>
-    <p:sldId id="259" r:id="rId4"/>
-    <p:sldId id="260" r:id="rId5"/>
-    <p:sldId id="261" r:id="rId6"/>
-    <p:sldId id="264" r:id="rId7"/>
-    <p:sldId id="265" r:id="rId8"/>
-    <p:sldId id="262" r:id="rId9"/>
-    <p:sldId id="263" r:id="rId10"/>
-    <p:sldId id="267" r:id="rId11"/>
-    <p:sldId id="266" r:id="rId12"/>
+    <p:sldId id="257" r:id="rId3"/>
+    <p:sldId id="258" r:id="rId4"/>
+    <p:sldId id="259" r:id="rId5"/>
+    <p:sldId id="260" r:id="rId6"/>
+    <p:sldId id="261" r:id="rId7"/>
+    <p:sldId id="264" r:id="rId8"/>
+    <p:sldId id="265" r:id="rId9"/>
+    <p:sldId id="262" r:id="rId10"/>
+    <p:sldId id="263" r:id="rId11"/>
+    <p:sldId id="267" r:id="rId12"/>
+    <p:sldId id="266" r:id="rId13"/>
   </p:sldIdLst>
   <p:sldSz cx="12192000" cy="6858000"/>
   <p:notesSz cx="6858000" cy="9144000"/>
@@ -114,11 +114,6 @@
       </a:defRPr>
     </a:lvl9pPr>
   </p:defaultTextStyle>
-  <p:extLst>
-    <p:ext uri="{EFAFB233-063F-42B5-8137-9DF3F51BA10A}">
-      <p15:sldGuideLst xmlns:p15="http://schemas.microsoft.com/office/powerpoint/2012/main"/>
-    </p:ext>
-  </p:extLst>
 </p:presentation>
 </file>
 
@@ -222,13 +217,13 @@
           <a:lstStyle>
             <a:lvl1pPr marL="0" indent="0" algn="ctr">
               <a:buNone/>
-              <a:defRPr sz="3733" b="0" i="0">
+              <a:defRPr sz="3735" b="0" i="0">
                 <a:solidFill>
                   <a:schemeClr val="tx1"/>
                 </a:solidFill>
               </a:defRPr>
             </a:lvl1pPr>
-            <a:lvl2pPr marL="609585" indent="0" algn="ctr">
+            <a:lvl2pPr marL="609600" indent="0" algn="ctr">
               <a:buNone/>
               <a:defRPr>
                 <a:solidFill>
@@ -238,7 +233,7 @@
                 </a:solidFill>
               </a:defRPr>
             </a:lvl2pPr>
-            <a:lvl3pPr marL="1219170" indent="0" algn="ctr">
+            <a:lvl3pPr marL="1219200" indent="0" algn="ctr">
               <a:buNone/>
               <a:defRPr>
                 <a:solidFill>
@@ -248,7 +243,7 @@
                 </a:solidFill>
               </a:defRPr>
             </a:lvl3pPr>
-            <a:lvl4pPr marL="1828754" indent="0" algn="ctr">
+            <a:lvl4pPr marL="1828800" indent="0" algn="ctr">
               <a:buNone/>
               <a:defRPr>
                 <a:solidFill>
@@ -258,7 +253,7 @@
                 </a:solidFill>
               </a:defRPr>
             </a:lvl4pPr>
-            <a:lvl5pPr marL="2438339" indent="0" algn="ctr">
+            <a:lvl5pPr marL="2438400" indent="0" algn="ctr">
               <a:buNone/>
               <a:defRPr>
                 <a:solidFill>
@@ -268,7 +263,7 @@
                 </a:solidFill>
               </a:defRPr>
             </a:lvl5pPr>
-            <a:lvl6pPr marL="3047924" indent="0" algn="ctr">
+            <a:lvl6pPr marL="3048000" indent="0" algn="ctr">
               <a:buNone/>
               <a:defRPr>
                 <a:solidFill>
@@ -278,7 +273,7 @@
                 </a:solidFill>
               </a:defRPr>
             </a:lvl6pPr>
-            <a:lvl7pPr marL="3657509" indent="0" algn="ctr">
+            <a:lvl7pPr marL="3657600" indent="0" algn="ctr">
               <a:buNone/>
               <a:defRPr>
                 <a:solidFill>
@@ -288,7 +283,7 @@
                 </a:solidFill>
               </a:defRPr>
             </a:lvl7pPr>
-            <a:lvl8pPr marL="4267093" indent="0" algn="ctr">
+            <a:lvl8pPr marL="4267200" indent="0" algn="ctr">
               <a:buNone/>
               <a:defRPr>
                 <a:solidFill>
@@ -298,7 +293,7 @@
                 </a:solidFill>
               </a:defRPr>
             </a:lvl8pPr>
-            <a:lvl9pPr marL="4876678" indent="0" algn="ctr">
+            <a:lvl9pPr marL="4876800" indent="0" algn="ctr">
               <a:buNone/>
               <a:defRPr>
                 <a:solidFill>
@@ -335,7 +330,6 @@
           <a:p>
             <a:fld id="{9184DA70-C731-4C70-880D-CCD4705E623C}" type="datetime1">
               <a:rPr lang="en-US" smtClean="0"/>
-              <a:t>8/19/2020</a:t>
             </a:fld>
             <a:endParaRPr lang="en-US" dirty="0"/>
           </a:p>
@@ -377,18 +371,12 @@
           <a:p>
             <a:fld id="{3A98EE3D-8CD1-4C3F-BD1C-C98C9596463C}" type="slidenum">
               <a:rPr lang="en-US" smtClean="0"/>
-              <a:t>‹#›</a:t>
             </a:fld>
             <a:endParaRPr lang="en-US" dirty="0"/>
           </a:p>
         </p:txBody>
       </p:sp>
     </p:spTree>
-    <p:extLst>
-      <p:ext uri="{BB962C8B-B14F-4D97-AF65-F5344CB8AC3E}">
-        <p14:creationId xmlns:p14="http://schemas.microsoft.com/office/powerpoint/2010/main" val="2664868757"/>
-      </p:ext>
-    </p:extLst>
   </p:cSld>
   <p:clrMapOvr>
     <a:masterClrMapping/>
@@ -433,7 +421,7 @@
           <a:bodyPr anchor="b"/>
           <a:lstStyle>
             <a:lvl1pPr algn="l">
-              <a:defRPr sz="2667" b="1"/>
+              <a:defRPr sz="2665" b="1"/>
             </a:lvl1pPr>
           </a:lstStyle>
           <a:p>
@@ -441,6 +429,7 @@
               <a:rPr lang="en-US"/>
               <a:t>Click to edit Master title style</a:t>
             </a:r>
+            <a:endParaRPr lang="en-US"/>
           </a:p>
         </p:txBody>
       </p:sp>
@@ -465,39 +454,39 @@
           <a:lstStyle>
             <a:lvl1pPr marL="0" indent="0">
               <a:buNone/>
-              <a:defRPr sz="4267"/>
+              <a:defRPr sz="4265"/>
             </a:lvl1pPr>
-            <a:lvl2pPr marL="609585" indent="0">
-              <a:buNone/>
-              <a:defRPr sz="3733"/>
+            <a:lvl2pPr marL="609600" indent="0">
+              <a:buNone/>
+              <a:defRPr sz="3735"/>
             </a:lvl2pPr>
-            <a:lvl3pPr marL="1219170" indent="0">
+            <a:lvl3pPr marL="1219200" indent="0">
               <a:buNone/>
               <a:defRPr sz="3200"/>
             </a:lvl3pPr>
-            <a:lvl4pPr marL="1828754" indent="0">
-              <a:buNone/>
-              <a:defRPr sz="2667"/>
+            <a:lvl4pPr marL="1828800" indent="0">
+              <a:buNone/>
+              <a:defRPr sz="2665"/>
             </a:lvl4pPr>
-            <a:lvl5pPr marL="2438339" indent="0">
-              <a:buNone/>
-              <a:defRPr sz="2667"/>
+            <a:lvl5pPr marL="2438400" indent="0">
+              <a:buNone/>
+              <a:defRPr sz="2665"/>
             </a:lvl5pPr>
-            <a:lvl6pPr marL="3047924" indent="0">
-              <a:buNone/>
-              <a:defRPr sz="2667"/>
+            <a:lvl6pPr marL="3048000" indent="0">
+              <a:buNone/>
+              <a:defRPr sz="2665"/>
             </a:lvl6pPr>
-            <a:lvl7pPr marL="3657509" indent="0">
-              <a:buNone/>
-              <a:defRPr sz="2667"/>
+            <a:lvl7pPr marL="3657600" indent="0">
+              <a:buNone/>
+              <a:defRPr sz="2665"/>
             </a:lvl7pPr>
-            <a:lvl8pPr marL="4267093" indent="0">
-              <a:buNone/>
-              <a:defRPr sz="2667"/>
+            <a:lvl8pPr marL="4267200" indent="0">
+              <a:buNone/>
+              <a:defRPr sz="2665"/>
             </a:lvl8pPr>
-            <a:lvl9pPr marL="4876678" indent="0">
-              <a:buNone/>
-              <a:defRPr sz="2667"/>
+            <a:lvl9pPr marL="4876800" indent="0">
+              <a:buNone/>
+              <a:defRPr sz="2665"/>
             </a:lvl9pPr>
           </a:lstStyle>
           <a:p>
@@ -505,6 +494,7 @@
               <a:rPr lang="en-US"/>
               <a:t>Click icon to add picture</a:t>
             </a:r>
+            <a:endParaRPr lang="en-US"/>
           </a:p>
         </p:txBody>
       </p:sp>
@@ -529,37 +519,37 @@
           <a:lstStyle>
             <a:lvl1pPr marL="0" indent="0">
               <a:buNone/>
-              <a:defRPr sz="1867"/>
+              <a:defRPr sz="1865"/>
             </a:lvl1pPr>
-            <a:lvl2pPr marL="609585" indent="0">
+            <a:lvl2pPr marL="609600" indent="0">
               <a:buNone/>
               <a:defRPr sz="1600"/>
             </a:lvl2pPr>
-            <a:lvl3pPr marL="1219170" indent="0">
-              <a:buNone/>
-              <a:defRPr sz="1333"/>
+            <a:lvl3pPr marL="1219200" indent="0">
+              <a:buNone/>
+              <a:defRPr sz="1335"/>
             </a:lvl3pPr>
-            <a:lvl4pPr marL="1828754" indent="0">
+            <a:lvl4pPr marL="1828800" indent="0">
               <a:buNone/>
               <a:defRPr sz="1200"/>
             </a:lvl4pPr>
-            <a:lvl5pPr marL="2438339" indent="0">
+            <a:lvl5pPr marL="2438400" indent="0">
               <a:buNone/>
               <a:defRPr sz="1200"/>
             </a:lvl5pPr>
-            <a:lvl6pPr marL="3047924" indent="0">
+            <a:lvl6pPr marL="3048000" indent="0">
               <a:buNone/>
               <a:defRPr sz="1200"/>
             </a:lvl6pPr>
-            <a:lvl7pPr marL="3657509" indent="0">
+            <a:lvl7pPr marL="3657600" indent="0">
               <a:buNone/>
               <a:defRPr sz="1200"/>
             </a:lvl7pPr>
-            <a:lvl8pPr marL="4267093" indent="0">
+            <a:lvl8pPr marL="4267200" indent="0">
               <a:buNone/>
               <a:defRPr sz="1200"/>
             </a:lvl8pPr>
-            <a:lvl9pPr marL="4876678" indent="0">
+            <a:lvl9pPr marL="4876800" indent="0">
               <a:buNone/>
               <a:defRPr sz="1200"/>
             </a:lvl9pPr>
@@ -570,6 +560,7 @@
               <a:rPr lang="en-US"/>
               <a:t>Click to edit Master text styles</a:t>
             </a:r>
+            <a:endParaRPr lang="en-US"/>
           </a:p>
         </p:txBody>
       </p:sp>
@@ -590,7 +581,6 @@
           <a:p>
             <a:fld id="{62D6E202-B606-4609-B914-27C9371A1F6D}" type="datetime1">
               <a:rPr lang="en-US" smtClean="0"/>
-              <a:t>8/19/2020</a:t>
             </a:fld>
             <a:endParaRPr lang="en-US" dirty="0"/>
           </a:p>
@@ -632,18 +622,12 @@
           <a:p>
             <a:fld id="{3A98EE3D-8CD1-4C3F-BD1C-C98C9596463C}" type="slidenum">
               <a:rPr lang="en-US" smtClean="0"/>
-              <a:t>‹#›</a:t>
             </a:fld>
             <a:endParaRPr lang="en-US" dirty="0"/>
           </a:p>
         </p:txBody>
       </p:sp>
     </p:spTree>
-    <p:extLst>
-      <p:ext uri="{BB962C8B-B14F-4D97-AF65-F5344CB8AC3E}">
-        <p14:creationId xmlns:p14="http://schemas.microsoft.com/office/powerpoint/2010/main" val="1355231726"/>
-      </p:ext>
-    </p:extLst>
   </p:cSld>
   <p:clrMapOvr>
     <a:masterClrMapping/>
@@ -688,6 +672,7 @@
               <a:rPr lang="en-US"/>
               <a:t>Click to edit Master title style</a:t>
             </a:r>
+            <a:endParaRPr lang="en-US"/>
           </a:p>
         </p:txBody>
       </p:sp>
@@ -711,6 +696,7 @@
               <a:rPr lang="en-US"/>
               <a:t>Click to edit Master text styles</a:t>
             </a:r>
+            <a:endParaRPr lang="en-US"/>
           </a:p>
           <a:p>
             <a:pPr lvl="1"/>
@@ -718,6 +704,7 @@
               <a:rPr lang="en-US"/>
               <a:t>Second level</a:t>
             </a:r>
+            <a:endParaRPr lang="en-US"/>
           </a:p>
           <a:p>
             <a:pPr lvl="2"/>
@@ -725,6 +712,7 @@
               <a:rPr lang="en-US"/>
               <a:t>Third level</a:t>
             </a:r>
+            <a:endParaRPr lang="en-US"/>
           </a:p>
           <a:p>
             <a:pPr lvl="3"/>
@@ -732,6 +720,7 @@
               <a:rPr lang="en-US"/>
               <a:t>Fourth level</a:t>
             </a:r>
+            <a:endParaRPr lang="en-US"/>
           </a:p>
           <a:p>
             <a:pPr lvl="4"/>
@@ -739,6 +728,7 @@
               <a:rPr lang="en-US"/>
               <a:t>Fifth level</a:t>
             </a:r>
+            <a:endParaRPr lang="en-US"/>
           </a:p>
         </p:txBody>
       </p:sp>
@@ -759,7 +749,6 @@
           <a:p>
             <a:fld id="{62D6E202-B606-4609-B914-27C9371A1F6D}" type="datetime1">
               <a:rPr lang="en-US" smtClean="0"/>
-              <a:t>8/19/2020</a:t>
             </a:fld>
             <a:endParaRPr lang="en-US" dirty="0"/>
           </a:p>
@@ -801,18 +790,12 @@
           <a:p>
             <a:fld id="{3A98EE3D-8CD1-4C3F-BD1C-C98C9596463C}" type="slidenum">
               <a:rPr lang="en-US" smtClean="0"/>
-              <a:t>‹#›</a:t>
             </a:fld>
             <a:endParaRPr lang="en-US" dirty="0"/>
           </a:p>
         </p:txBody>
       </p:sp>
     </p:spTree>
-    <p:extLst>
-      <p:ext uri="{BB962C8B-B14F-4D97-AF65-F5344CB8AC3E}">
-        <p14:creationId xmlns:p14="http://schemas.microsoft.com/office/powerpoint/2010/main" val="2458319751"/>
-      </p:ext>
-    </p:extLst>
   </p:cSld>
   <p:clrMapOvr>
     <a:masterClrMapping/>
@@ -862,6 +845,7 @@
               <a:rPr lang="en-US"/>
               <a:t>Click to edit Master title style</a:t>
             </a:r>
+            <a:endParaRPr lang="en-US"/>
           </a:p>
         </p:txBody>
       </p:sp>
@@ -890,6 +874,7 @@
               <a:rPr lang="en-US"/>
               <a:t>Click to edit Master text styles</a:t>
             </a:r>
+            <a:endParaRPr lang="en-US"/>
           </a:p>
           <a:p>
             <a:pPr lvl="1"/>
@@ -897,6 +882,7 @@
               <a:rPr lang="en-US"/>
               <a:t>Second level</a:t>
             </a:r>
+            <a:endParaRPr lang="en-US"/>
           </a:p>
           <a:p>
             <a:pPr lvl="2"/>
@@ -904,6 +890,7 @@
               <a:rPr lang="en-US"/>
               <a:t>Third level</a:t>
             </a:r>
+            <a:endParaRPr lang="en-US"/>
           </a:p>
           <a:p>
             <a:pPr lvl="3"/>
@@ -911,6 +898,7 @@
               <a:rPr lang="en-US"/>
               <a:t>Fourth level</a:t>
             </a:r>
+            <a:endParaRPr lang="en-US"/>
           </a:p>
           <a:p>
             <a:pPr lvl="4"/>
@@ -918,6 +906,7 @@
               <a:rPr lang="en-US"/>
               <a:t>Fifth level</a:t>
             </a:r>
+            <a:endParaRPr lang="en-US"/>
           </a:p>
         </p:txBody>
       </p:sp>
@@ -938,7 +927,6 @@
           <a:p>
             <a:fld id="{62D6E202-B606-4609-B914-27C9371A1F6D}" type="datetime1">
               <a:rPr lang="en-US" smtClean="0"/>
-              <a:t>8/19/2020</a:t>
             </a:fld>
             <a:endParaRPr lang="en-US" dirty="0"/>
           </a:p>
@@ -980,7 +968,6 @@
           <a:p>
             <a:fld id="{3A98EE3D-8CD1-4C3F-BD1C-C98C9596463C}" type="slidenum">
               <a:rPr lang="en-US" smtClean="0"/>
-              <a:t>‹#›</a:t>
             </a:fld>
             <a:endParaRPr lang="en-US" dirty="0"/>
           </a:p>
@@ -988,13 +975,7 @@
       </p:sp>
       <p:pic>
         <p:nvPicPr>
-          <p:cNvPr id="7" name="Picture 6" descr="E:\websites\free-power-point-templates\2012\logos.png">
-            <a:extLst>
-              <a:ext uri="{FF2B5EF4-FFF2-40B4-BE49-F238E27FC236}">
-                <a16:creationId xmlns:a16="http://schemas.microsoft.com/office/drawing/2014/main" id="{EF2BCCD2-B51E-485F-A49D-4B12B4AA9EA5}"/>
-              </a:ext>
-            </a:extLst>
-          </p:cNvPr>
+          <p:cNvPr id="7" name="Picture 6" descr="E:\websites\free-power-point-templates\2012\logos.png"/>
           <p:cNvPicPr>
             <a:picLocks noChangeAspect="1" noChangeArrowheads="1"/>
           </p:cNvPicPr>
@@ -1036,11 +1017,6 @@
         </p:spPr>
       </p:pic>
     </p:spTree>
-    <p:extLst>
-      <p:ext uri="{BB962C8B-B14F-4D97-AF65-F5344CB8AC3E}">
-        <p14:creationId xmlns:p14="http://schemas.microsoft.com/office/powerpoint/2010/main" val="2397938003"/>
-      </p:ext>
-    </p:extLst>
   </p:cSld>
   <p:clrMapOvr>
     <a:masterClrMapping/>
@@ -1131,7 +1107,7 @@
           <a:bodyPr/>
           <a:lstStyle>
             <a:lvl1pPr algn="ctr">
-              <a:defRPr sz="3733">
+              <a:defRPr sz="3735">
                 <a:solidFill>
                   <a:schemeClr val="tx1"/>
                 </a:solidFill>
@@ -1172,6 +1148,7 @@
               <a:rPr lang="en-US"/>
               <a:t>Click to edit Master text styles</a:t>
             </a:r>
+            <a:endParaRPr lang="en-US"/>
           </a:p>
           <a:p>
             <a:pPr lvl="1"/>
@@ -1179,6 +1156,7 @@
               <a:rPr lang="en-US"/>
               <a:t>Second level</a:t>
             </a:r>
+            <a:endParaRPr lang="en-US"/>
           </a:p>
           <a:p>
             <a:pPr lvl="2"/>
@@ -1186,6 +1164,7 @@
               <a:rPr lang="en-US"/>
               <a:t>Third level</a:t>
             </a:r>
+            <a:endParaRPr lang="en-US"/>
           </a:p>
           <a:p>
             <a:pPr lvl="3"/>
@@ -1193,6 +1172,7 @@
               <a:rPr lang="en-US"/>
               <a:t>Fourth level</a:t>
             </a:r>
+            <a:endParaRPr lang="en-US"/>
           </a:p>
           <a:p>
             <a:pPr lvl="4"/>
@@ -1221,7 +1201,6 @@
           <a:p>
             <a:fld id="{62D6E202-B606-4609-B914-27C9371A1F6D}" type="datetime1">
               <a:rPr lang="en-US" smtClean="0"/>
-              <a:t>8/19/2020</a:t>
             </a:fld>
             <a:endParaRPr lang="en-US" dirty="0"/>
           </a:p>
@@ -1263,18 +1242,12 @@
           <a:p>
             <a:fld id="{3A98EE3D-8CD1-4C3F-BD1C-C98C9596463C}" type="slidenum">
               <a:rPr lang="en-US" smtClean="0"/>
-              <a:t>‹#›</a:t>
             </a:fld>
             <a:endParaRPr lang="en-US" dirty="0"/>
           </a:p>
         </p:txBody>
       </p:sp>
     </p:spTree>
-    <p:extLst>
-      <p:ext uri="{BB962C8B-B14F-4D97-AF65-F5344CB8AC3E}">
-        <p14:creationId xmlns:p14="http://schemas.microsoft.com/office/powerpoint/2010/main" val="3275111185"/>
-      </p:ext>
-    </p:extLst>
   </p:cSld>
   <p:clrMapOvr>
     <a:masterClrMapping/>
@@ -1379,7 +1352,7 @@
           <a:bodyPr/>
           <a:lstStyle>
             <a:lvl1pPr>
-              <a:defRPr sz="3733">
+              <a:defRPr sz="3735">
                 <a:solidFill>
                   <a:schemeClr val="tx1"/>
                 </a:solidFill>
@@ -1420,6 +1393,7 @@
               <a:rPr lang="en-US"/>
               <a:t>Click to edit Master text styles</a:t>
             </a:r>
+            <a:endParaRPr lang="en-US"/>
           </a:p>
           <a:p>
             <a:pPr lvl="1"/>
@@ -1427,6 +1401,7 @@
               <a:rPr lang="en-US"/>
               <a:t>Second level</a:t>
             </a:r>
+            <a:endParaRPr lang="en-US"/>
           </a:p>
           <a:p>
             <a:pPr lvl="2"/>
@@ -1434,6 +1409,7 @@
               <a:rPr lang="en-US"/>
               <a:t>Third level</a:t>
             </a:r>
+            <a:endParaRPr lang="en-US"/>
           </a:p>
           <a:p>
             <a:pPr lvl="3"/>
@@ -1441,6 +1417,7 @@
               <a:rPr lang="en-US"/>
               <a:t>Fourth level</a:t>
             </a:r>
+            <a:endParaRPr lang="en-US"/>
           </a:p>
           <a:p>
             <a:pPr lvl="4"/>
@@ -1469,7 +1446,6 @@
           <a:p>
             <a:fld id="{62D6E202-B606-4609-B914-27C9371A1F6D}" type="datetime1">
               <a:rPr lang="en-US" smtClean="0"/>
-              <a:t>8/19/2020</a:t>
             </a:fld>
             <a:endParaRPr lang="en-US" dirty="0"/>
           </a:p>
@@ -1511,18 +1487,12 @@
           <a:p>
             <a:fld id="{3A98EE3D-8CD1-4C3F-BD1C-C98C9596463C}" type="slidenum">
               <a:rPr lang="en-US" smtClean="0"/>
-              <a:t>‹#›</a:t>
             </a:fld>
             <a:endParaRPr lang="en-US" dirty="0"/>
           </a:p>
         </p:txBody>
       </p:sp>
     </p:spTree>
-    <p:extLst>
-      <p:ext uri="{BB962C8B-B14F-4D97-AF65-F5344CB8AC3E}">
-        <p14:creationId xmlns:p14="http://schemas.microsoft.com/office/powerpoint/2010/main" val="2964830552"/>
-      </p:ext>
-    </p:extLst>
   </p:cSld>
   <p:clrMapOvr>
     <a:masterClrMapping/>
@@ -1568,7 +1538,7 @@
           <a:bodyPr anchor="t"/>
           <a:lstStyle>
             <a:lvl1pPr algn="l">
-              <a:defRPr sz="5333" b="1" cap="all"/>
+              <a:defRPr sz="5335" b="1" cap="all"/>
             </a:lvl1pPr>
           </a:lstStyle>
           <a:p>
@@ -1576,6 +1546,7 @@
               <a:rPr lang="en-US"/>
               <a:t>Click to edit Master title style</a:t>
             </a:r>
+            <a:endParaRPr lang="en-US"/>
           </a:p>
         </p:txBody>
       </p:sp>
@@ -1600,7 +1571,7 @@
           <a:lstStyle>
             <a:lvl1pPr marL="0" indent="0">
               <a:buNone/>
-              <a:defRPr sz="2667">
+              <a:defRPr sz="2665">
                 <a:solidFill>
                   <a:schemeClr val="tx1">
                     <a:tint val="75000"/>
@@ -1608,7 +1579,7 @@
                 </a:solidFill>
               </a:defRPr>
             </a:lvl1pPr>
-            <a:lvl2pPr marL="609585" indent="0">
+            <a:lvl2pPr marL="609600" indent="0">
               <a:buNone/>
               <a:defRPr sz="2400">
                 <a:solidFill>
@@ -1618,9 +1589,9 @@
                 </a:solidFill>
               </a:defRPr>
             </a:lvl2pPr>
-            <a:lvl3pPr marL="1219170" indent="0">
-              <a:buNone/>
-              <a:defRPr sz="2133">
+            <a:lvl3pPr marL="1219200" indent="0">
+              <a:buNone/>
+              <a:defRPr sz="2135">
                 <a:solidFill>
                   <a:schemeClr val="tx1">
                     <a:tint val="75000"/>
@@ -1628,9 +1599,9 @@
                 </a:solidFill>
               </a:defRPr>
             </a:lvl3pPr>
-            <a:lvl4pPr marL="1828754" indent="0">
-              <a:buNone/>
-              <a:defRPr sz="1867">
+            <a:lvl4pPr marL="1828800" indent="0">
+              <a:buNone/>
+              <a:defRPr sz="1865">
                 <a:solidFill>
                   <a:schemeClr val="tx1">
                     <a:tint val="75000"/>
@@ -1638,9 +1609,9 @@
                 </a:solidFill>
               </a:defRPr>
             </a:lvl4pPr>
-            <a:lvl5pPr marL="2438339" indent="0">
-              <a:buNone/>
-              <a:defRPr sz="1867">
+            <a:lvl5pPr marL="2438400" indent="0">
+              <a:buNone/>
+              <a:defRPr sz="1865">
                 <a:solidFill>
                   <a:schemeClr val="tx1">
                     <a:tint val="75000"/>
@@ -1648,9 +1619,9 @@
                 </a:solidFill>
               </a:defRPr>
             </a:lvl5pPr>
-            <a:lvl6pPr marL="3047924" indent="0">
-              <a:buNone/>
-              <a:defRPr sz="1867">
+            <a:lvl6pPr marL="3048000" indent="0">
+              <a:buNone/>
+              <a:defRPr sz="1865">
                 <a:solidFill>
                   <a:schemeClr val="tx1">
                     <a:tint val="75000"/>
@@ -1658,9 +1629,9 @@
                 </a:solidFill>
               </a:defRPr>
             </a:lvl6pPr>
-            <a:lvl7pPr marL="3657509" indent="0">
-              <a:buNone/>
-              <a:defRPr sz="1867">
+            <a:lvl7pPr marL="3657600" indent="0">
+              <a:buNone/>
+              <a:defRPr sz="1865">
                 <a:solidFill>
                   <a:schemeClr val="tx1">
                     <a:tint val="75000"/>
@@ -1668,9 +1639,9 @@
                 </a:solidFill>
               </a:defRPr>
             </a:lvl7pPr>
-            <a:lvl8pPr marL="4267093" indent="0">
-              <a:buNone/>
-              <a:defRPr sz="1867">
+            <a:lvl8pPr marL="4267200" indent="0">
+              <a:buNone/>
+              <a:defRPr sz="1865">
                 <a:solidFill>
                   <a:schemeClr val="tx1">
                     <a:tint val="75000"/>
@@ -1678,9 +1649,9 @@
                 </a:solidFill>
               </a:defRPr>
             </a:lvl8pPr>
-            <a:lvl9pPr marL="4876678" indent="0">
-              <a:buNone/>
-              <a:defRPr sz="1867">
+            <a:lvl9pPr marL="4876800" indent="0">
+              <a:buNone/>
+              <a:defRPr sz="1865">
                 <a:solidFill>
                   <a:schemeClr val="tx1">
                     <a:tint val="75000"/>
@@ -1695,6 +1666,7 @@
               <a:rPr lang="en-US"/>
               <a:t>Click to edit Master text styles</a:t>
             </a:r>
+            <a:endParaRPr lang="en-US"/>
           </a:p>
         </p:txBody>
       </p:sp>
@@ -1715,7 +1687,6 @@
           <a:p>
             <a:fld id="{97669AF7-7BEB-44E4-9852-375E34362B5B}" type="datetime1">
               <a:rPr lang="en-US" smtClean="0"/>
-              <a:t>8/19/2020</a:t>
             </a:fld>
             <a:endParaRPr lang="en-US" dirty="0"/>
           </a:p>
@@ -1757,18 +1728,12 @@
           <a:p>
             <a:fld id="{3A98EE3D-8CD1-4C3F-BD1C-C98C9596463C}" type="slidenum">
               <a:rPr lang="en-US" smtClean="0"/>
-              <a:t>‹#›</a:t>
             </a:fld>
             <a:endParaRPr lang="en-US" dirty="0"/>
           </a:p>
         </p:txBody>
       </p:sp>
     </p:spTree>
-    <p:extLst>
-      <p:ext uri="{BB962C8B-B14F-4D97-AF65-F5344CB8AC3E}">
-        <p14:creationId xmlns:p14="http://schemas.microsoft.com/office/powerpoint/2010/main" val="571656947"/>
-      </p:ext>
-    </p:extLst>
   </p:cSld>
   <p:clrMapOvr>
     <a:masterClrMapping/>
@@ -1812,6 +1777,7 @@
               <a:rPr lang="en-US"/>
               <a:t>Click to edit Master title style</a:t>
             </a:r>
+            <a:endParaRPr lang="en-US"/>
           </a:p>
         </p:txBody>
       </p:sp>
@@ -1835,13 +1801,13 @@
           <a:bodyPr/>
           <a:lstStyle>
             <a:lvl1pPr>
-              <a:defRPr sz="3733"/>
+              <a:defRPr sz="3735"/>
             </a:lvl1pPr>
             <a:lvl2pPr>
               <a:defRPr sz="3200"/>
             </a:lvl2pPr>
             <a:lvl3pPr>
-              <a:defRPr sz="2667"/>
+              <a:defRPr sz="2665"/>
             </a:lvl3pPr>
             <a:lvl4pPr>
               <a:defRPr sz="2400"/>
@@ -1868,6 +1834,7 @@
               <a:rPr lang="en-US"/>
               <a:t>Click to edit Master text styles</a:t>
             </a:r>
+            <a:endParaRPr lang="en-US"/>
           </a:p>
           <a:p>
             <a:pPr lvl="1"/>
@@ -1875,6 +1842,7 @@
               <a:rPr lang="en-US"/>
               <a:t>Second level</a:t>
             </a:r>
+            <a:endParaRPr lang="en-US"/>
           </a:p>
           <a:p>
             <a:pPr lvl="2"/>
@@ -1882,6 +1850,7 @@
               <a:rPr lang="en-US"/>
               <a:t>Third level</a:t>
             </a:r>
+            <a:endParaRPr lang="en-US"/>
           </a:p>
           <a:p>
             <a:pPr lvl="3"/>
@@ -1889,6 +1858,7 @@
               <a:rPr lang="en-US"/>
               <a:t>Fourth level</a:t>
             </a:r>
+            <a:endParaRPr lang="en-US"/>
           </a:p>
           <a:p>
             <a:pPr lvl="4"/>
@@ -1896,6 +1866,7 @@
               <a:rPr lang="en-US"/>
               <a:t>Fifth level</a:t>
             </a:r>
+            <a:endParaRPr lang="en-US"/>
           </a:p>
         </p:txBody>
       </p:sp>
@@ -1919,13 +1890,13 @@
           <a:bodyPr/>
           <a:lstStyle>
             <a:lvl1pPr>
-              <a:defRPr sz="3733"/>
+              <a:defRPr sz="3735"/>
             </a:lvl1pPr>
             <a:lvl2pPr>
               <a:defRPr sz="3200"/>
             </a:lvl2pPr>
             <a:lvl3pPr>
-              <a:defRPr sz="2667"/>
+              <a:defRPr sz="2665"/>
             </a:lvl3pPr>
             <a:lvl4pPr>
               <a:defRPr sz="2400"/>
@@ -1952,6 +1923,7 @@
               <a:rPr lang="en-US"/>
               <a:t>Click to edit Master text styles</a:t>
             </a:r>
+            <a:endParaRPr lang="en-US"/>
           </a:p>
           <a:p>
             <a:pPr lvl="1"/>
@@ -1959,6 +1931,7 @@
               <a:rPr lang="en-US"/>
               <a:t>Second level</a:t>
             </a:r>
+            <a:endParaRPr lang="en-US"/>
           </a:p>
           <a:p>
             <a:pPr lvl="2"/>
@@ -1966,6 +1939,7 @@
               <a:rPr lang="en-US"/>
               <a:t>Third level</a:t>
             </a:r>
+            <a:endParaRPr lang="en-US"/>
           </a:p>
           <a:p>
             <a:pPr lvl="3"/>
@@ -1973,6 +1947,7 @@
               <a:rPr lang="en-US"/>
               <a:t>Fourth level</a:t>
             </a:r>
+            <a:endParaRPr lang="en-US"/>
           </a:p>
           <a:p>
             <a:pPr lvl="4"/>
@@ -1980,6 +1955,7 @@
               <a:rPr lang="en-US"/>
               <a:t>Fifth level</a:t>
             </a:r>
+            <a:endParaRPr lang="en-US"/>
           </a:p>
         </p:txBody>
       </p:sp>
@@ -2000,7 +1976,6 @@
           <a:p>
             <a:fld id="{62D6E202-B606-4609-B914-27C9371A1F6D}" type="datetime1">
               <a:rPr lang="en-US" smtClean="0"/>
-              <a:t>8/19/2020</a:t>
             </a:fld>
             <a:endParaRPr lang="en-US" dirty="0"/>
           </a:p>
@@ -2042,18 +2017,12 @@
           <a:p>
             <a:fld id="{3A98EE3D-8CD1-4C3F-BD1C-C98C9596463C}" type="slidenum">
               <a:rPr lang="en-US" smtClean="0"/>
-              <a:t>‹#›</a:t>
             </a:fld>
             <a:endParaRPr lang="en-US" dirty="0"/>
           </a:p>
         </p:txBody>
       </p:sp>
     </p:spTree>
-    <p:extLst>
-      <p:ext uri="{BB962C8B-B14F-4D97-AF65-F5344CB8AC3E}">
-        <p14:creationId xmlns:p14="http://schemas.microsoft.com/office/powerpoint/2010/main" val="2185012056"/>
-      </p:ext>
-    </p:extLst>
   </p:cSld>
   <p:clrMapOvr>
     <a:masterClrMapping/>
@@ -2151,37 +2120,37 @@
                 </a:solidFill>
               </a:defRPr>
             </a:lvl1pPr>
-            <a:lvl2pPr marL="609585" indent="0">
-              <a:buNone/>
-              <a:defRPr sz="2667" b="1"/>
+            <a:lvl2pPr marL="609600" indent="0">
+              <a:buNone/>
+              <a:defRPr sz="2665" b="1"/>
             </a:lvl2pPr>
-            <a:lvl3pPr marL="1219170" indent="0">
+            <a:lvl3pPr marL="1219200" indent="0">
               <a:buNone/>
               <a:defRPr sz="2400" b="1"/>
             </a:lvl3pPr>
-            <a:lvl4pPr marL="1828754" indent="0">
-              <a:buNone/>
-              <a:defRPr sz="2133" b="1"/>
+            <a:lvl4pPr marL="1828800" indent="0">
+              <a:buNone/>
+              <a:defRPr sz="2135" b="1"/>
             </a:lvl4pPr>
-            <a:lvl5pPr marL="2438339" indent="0">
-              <a:buNone/>
-              <a:defRPr sz="2133" b="1"/>
+            <a:lvl5pPr marL="2438400" indent="0">
+              <a:buNone/>
+              <a:defRPr sz="2135" b="1"/>
             </a:lvl5pPr>
-            <a:lvl6pPr marL="3047924" indent="0">
-              <a:buNone/>
-              <a:defRPr sz="2133" b="1"/>
+            <a:lvl6pPr marL="3048000" indent="0">
+              <a:buNone/>
+              <a:defRPr sz="2135" b="1"/>
             </a:lvl6pPr>
-            <a:lvl7pPr marL="3657509" indent="0">
-              <a:buNone/>
-              <a:defRPr sz="2133" b="1"/>
+            <a:lvl7pPr marL="3657600" indent="0">
+              <a:buNone/>
+              <a:defRPr sz="2135" b="1"/>
             </a:lvl7pPr>
-            <a:lvl8pPr marL="4267093" indent="0">
-              <a:buNone/>
-              <a:defRPr sz="2133" b="1"/>
+            <a:lvl8pPr marL="4267200" indent="0">
+              <a:buNone/>
+              <a:defRPr sz="2135" b="1"/>
             </a:lvl8pPr>
-            <a:lvl9pPr marL="4876678" indent="0">
-              <a:buNone/>
-              <a:defRPr sz="2133" b="1"/>
+            <a:lvl9pPr marL="4876800" indent="0">
+              <a:buNone/>
+              <a:defRPr sz="2135" b="1"/>
             </a:lvl9pPr>
           </a:lstStyle>
           <a:p>
@@ -2190,6 +2159,7 @@
               <a:rPr lang="en-US"/>
               <a:t>Click to edit Master text styles</a:t>
             </a:r>
+            <a:endParaRPr lang="en-US"/>
           </a:p>
         </p:txBody>
       </p:sp>
@@ -2220,7 +2190,7 @@
               </a:defRPr>
             </a:lvl1pPr>
             <a:lvl2pPr algn="ctr">
-              <a:defRPr sz="2667">
+              <a:defRPr sz="2665">
                 <a:solidFill>
                   <a:schemeClr val="tx1"/>
                 </a:solidFill>
@@ -2234,30 +2204,30 @@
               </a:defRPr>
             </a:lvl3pPr>
             <a:lvl4pPr algn="ctr">
-              <a:defRPr sz="2133">
+              <a:defRPr sz="2135">
                 <a:solidFill>
                   <a:schemeClr val="tx1"/>
                 </a:solidFill>
               </a:defRPr>
             </a:lvl4pPr>
             <a:lvl5pPr algn="ctr">
-              <a:defRPr sz="2133">
+              <a:defRPr sz="2135">
                 <a:solidFill>
                   <a:schemeClr val="tx1"/>
                 </a:solidFill>
               </a:defRPr>
             </a:lvl5pPr>
             <a:lvl6pPr>
-              <a:defRPr sz="2133"/>
+              <a:defRPr sz="2135"/>
             </a:lvl6pPr>
             <a:lvl7pPr>
-              <a:defRPr sz="2133"/>
+              <a:defRPr sz="2135"/>
             </a:lvl7pPr>
             <a:lvl8pPr>
-              <a:defRPr sz="2133"/>
+              <a:defRPr sz="2135"/>
             </a:lvl8pPr>
             <a:lvl9pPr>
-              <a:defRPr sz="2133"/>
+              <a:defRPr sz="2135"/>
             </a:lvl9pPr>
           </a:lstStyle>
           <a:p>
@@ -2266,6 +2236,7 @@
               <a:rPr lang="en-US"/>
               <a:t>Click to edit Master text styles</a:t>
             </a:r>
+            <a:endParaRPr lang="en-US"/>
           </a:p>
           <a:p>
             <a:pPr lvl="1"/>
@@ -2273,6 +2244,7 @@
               <a:rPr lang="en-US"/>
               <a:t>Second level</a:t>
             </a:r>
+            <a:endParaRPr lang="en-US"/>
           </a:p>
           <a:p>
             <a:pPr lvl="2"/>
@@ -2280,6 +2252,7 @@
               <a:rPr lang="en-US"/>
               <a:t>Third level</a:t>
             </a:r>
+            <a:endParaRPr lang="en-US"/>
           </a:p>
           <a:p>
             <a:pPr lvl="3"/>
@@ -2287,6 +2260,7 @@
               <a:rPr lang="en-US"/>
               <a:t>Fourth level</a:t>
             </a:r>
+            <a:endParaRPr lang="en-US"/>
           </a:p>
           <a:p>
             <a:pPr lvl="4"/>
@@ -2325,37 +2299,37 @@
                 </a:solidFill>
               </a:defRPr>
             </a:lvl1pPr>
-            <a:lvl2pPr marL="609585" indent="0">
-              <a:buNone/>
-              <a:defRPr sz="2667" b="1"/>
+            <a:lvl2pPr marL="609600" indent="0">
+              <a:buNone/>
+              <a:defRPr sz="2665" b="1"/>
             </a:lvl2pPr>
-            <a:lvl3pPr marL="1219170" indent="0">
+            <a:lvl3pPr marL="1219200" indent="0">
               <a:buNone/>
               <a:defRPr sz="2400" b="1"/>
             </a:lvl3pPr>
-            <a:lvl4pPr marL="1828754" indent="0">
-              <a:buNone/>
-              <a:defRPr sz="2133" b="1"/>
+            <a:lvl4pPr marL="1828800" indent="0">
+              <a:buNone/>
+              <a:defRPr sz="2135" b="1"/>
             </a:lvl4pPr>
-            <a:lvl5pPr marL="2438339" indent="0">
-              <a:buNone/>
-              <a:defRPr sz="2133" b="1"/>
+            <a:lvl5pPr marL="2438400" indent="0">
+              <a:buNone/>
+              <a:defRPr sz="2135" b="1"/>
             </a:lvl5pPr>
-            <a:lvl6pPr marL="3047924" indent="0">
-              <a:buNone/>
-              <a:defRPr sz="2133" b="1"/>
+            <a:lvl6pPr marL="3048000" indent="0">
+              <a:buNone/>
+              <a:defRPr sz="2135" b="1"/>
             </a:lvl6pPr>
-            <a:lvl7pPr marL="3657509" indent="0">
-              <a:buNone/>
-              <a:defRPr sz="2133" b="1"/>
+            <a:lvl7pPr marL="3657600" indent="0">
+              <a:buNone/>
+              <a:defRPr sz="2135" b="1"/>
             </a:lvl7pPr>
-            <a:lvl8pPr marL="4267093" indent="0">
-              <a:buNone/>
-              <a:defRPr sz="2133" b="1"/>
+            <a:lvl8pPr marL="4267200" indent="0">
+              <a:buNone/>
+              <a:defRPr sz="2135" b="1"/>
             </a:lvl8pPr>
-            <a:lvl9pPr marL="4876678" indent="0">
-              <a:buNone/>
-              <a:defRPr sz="2133" b="1"/>
+            <a:lvl9pPr marL="4876800" indent="0">
+              <a:buNone/>
+              <a:defRPr sz="2135" b="1"/>
             </a:lvl9pPr>
           </a:lstStyle>
           <a:p>
@@ -2364,6 +2338,7 @@
               <a:rPr lang="en-US"/>
               <a:t>Click to edit Master text styles</a:t>
             </a:r>
+            <a:endParaRPr lang="en-US"/>
           </a:p>
         </p:txBody>
       </p:sp>
@@ -2394,7 +2369,7 @@
               </a:defRPr>
             </a:lvl1pPr>
             <a:lvl2pPr algn="ctr">
-              <a:defRPr sz="2667">
+              <a:defRPr sz="2665">
                 <a:solidFill>
                   <a:schemeClr val="tx1"/>
                 </a:solidFill>
@@ -2408,30 +2383,30 @@
               </a:defRPr>
             </a:lvl3pPr>
             <a:lvl4pPr algn="ctr">
-              <a:defRPr sz="2133">
+              <a:defRPr sz="2135">
                 <a:solidFill>
                   <a:schemeClr val="tx1"/>
                 </a:solidFill>
               </a:defRPr>
             </a:lvl4pPr>
             <a:lvl5pPr algn="ctr">
-              <a:defRPr sz="2133">
+              <a:defRPr sz="2135">
                 <a:solidFill>
                   <a:schemeClr val="tx1"/>
                 </a:solidFill>
               </a:defRPr>
             </a:lvl5pPr>
             <a:lvl6pPr>
-              <a:defRPr sz="2133"/>
+              <a:defRPr sz="2135"/>
             </a:lvl6pPr>
             <a:lvl7pPr>
-              <a:defRPr sz="2133"/>
+              <a:defRPr sz="2135"/>
             </a:lvl7pPr>
             <a:lvl8pPr>
-              <a:defRPr sz="2133"/>
+              <a:defRPr sz="2135"/>
             </a:lvl8pPr>
             <a:lvl9pPr>
-              <a:defRPr sz="2133"/>
+              <a:defRPr sz="2135"/>
             </a:lvl9pPr>
           </a:lstStyle>
           <a:p>
@@ -2440,6 +2415,7 @@
               <a:rPr lang="en-US"/>
               <a:t>Click to edit Master text styles</a:t>
             </a:r>
+            <a:endParaRPr lang="en-US"/>
           </a:p>
           <a:p>
             <a:pPr lvl="1"/>
@@ -2447,6 +2423,7 @@
               <a:rPr lang="en-US"/>
               <a:t>Second level</a:t>
             </a:r>
+            <a:endParaRPr lang="en-US"/>
           </a:p>
           <a:p>
             <a:pPr lvl="2"/>
@@ -2454,6 +2431,7 @@
               <a:rPr lang="en-US"/>
               <a:t>Third level</a:t>
             </a:r>
+            <a:endParaRPr lang="en-US"/>
           </a:p>
           <a:p>
             <a:pPr lvl="3"/>
@@ -2461,6 +2439,7 @@
               <a:rPr lang="en-US"/>
               <a:t>Fourth level</a:t>
             </a:r>
+            <a:endParaRPr lang="en-US"/>
           </a:p>
           <a:p>
             <a:pPr lvl="4"/>
@@ -2489,7 +2468,6 @@
           <a:p>
             <a:fld id="{62D6E202-B606-4609-B914-27C9371A1F6D}" type="datetime1">
               <a:rPr lang="en-US" smtClean="0"/>
-              <a:t>8/19/2020</a:t>
             </a:fld>
             <a:endParaRPr lang="en-US" dirty="0"/>
           </a:p>
@@ -2531,18 +2509,12 @@
           <a:p>
             <a:fld id="{3A98EE3D-8CD1-4C3F-BD1C-C98C9596463C}" type="slidenum">
               <a:rPr lang="en-US" smtClean="0"/>
-              <a:t>‹#›</a:t>
             </a:fld>
             <a:endParaRPr lang="en-US" dirty="0"/>
           </a:p>
         </p:txBody>
       </p:sp>
     </p:spTree>
-    <p:extLst>
-      <p:ext uri="{BB962C8B-B14F-4D97-AF65-F5344CB8AC3E}">
-        <p14:creationId xmlns:p14="http://schemas.microsoft.com/office/powerpoint/2010/main" val="1365633312"/>
-      </p:ext>
-    </p:extLst>
   </p:cSld>
   <p:clrMapOvr>
     <a:masterClrMapping/>
@@ -2587,6 +2559,7 @@
               <a:rPr lang="en-US"/>
               <a:t>Click to edit Master title style</a:t>
             </a:r>
+            <a:endParaRPr lang="en-US"/>
           </a:p>
         </p:txBody>
       </p:sp>
@@ -2607,7 +2580,6 @@
           <a:p>
             <a:fld id="{1775B394-D9F9-4F0C-B15D-605F45CB9E9F}" type="datetime1">
               <a:rPr lang="en-US" smtClean="0"/>
-              <a:t>8/19/2020</a:t>
             </a:fld>
             <a:endParaRPr lang="en-US" dirty="0"/>
           </a:p>
@@ -2649,18 +2621,12 @@
           <a:p>
             <a:fld id="{3A98EE3D-8CD1-4C3F-BD1C-C98C9596463C}" type="slidenum">
               <a:rPr lang="en-US" smtClean="0"/>
-              <a:t>‹#›</a:t>
             </a:fld>
             <a:endParaRPr lang="en-US" dirty="0"/>
           </a:p>
         </p:txBody>
       </p:sp>
     </p:spTree>
-    <p:extLst>
-      <p:ext uri="{BB962C8B-B14F-4D97-AF65-F5344CB8AC3E}">
-        <p14:creationId xmlns:p14="http://schemas.microsoft.com/office/powerpoint/2010/main" val="3596438608"/>
-      </p:ext>
-    </p:extLst>
   </p:cSld>
   <p:clrMapOvr>
     <a:masterClrMapping/>
@@ -2702,7 +2668,6 @@
           <a:p>
             <a:fld id="{39667345-2558-425A-8533-9BFDBCE15005}" type="datetime1">
               <a:rPr lang="en-US" smtClean="0"/>
-              <a:t>8/19/2020</a:t>
             </a:fld>
             <a:endParaRPr lang="en-US" dirty="0"/>
           </a:p>
@@ -2744,18 +2709,12 @@
           <a:p>
             <a:fld id="{3A98EE3D-8CD1-4C3F-BD1C-C98C9596463C}" type="slidenum">
               <a:rPr lang="en-US" smtClean="0"/>
-              <a:t>‹#›</a:t>
             </a:fld>
             <a:endParaRPr lang="en-US" dirty="0"/>
           </a:p>
         </p:txBody>
       </p:sp>
     </p:spTree>
-    <p:extLst>
-      <p:ext uri="{BB962C8B-B14F-4D97-AF65-F5344CB8AC3E}">
-        <p14:creationId xmlns:p14="http://schemas.microsoft.com/office/powerpoint/2010/main" val="2510739038"/>
-      </p:ext>
-    </p:extLst>
   </p:cSld>
   <p:clrMapOvr>
     <a:masterClrMapping/>
@@ -2800,7 +2759,7 @@
           <a:bodyPr anchor="b"/>
           <a:lstStyle>
             <a:lvl1pPr algn="l">
-              <a:defRPr sz="2667" b="1"/>
+              <a:defRPr sz="2665" b="1"/>
             </a:lvl1pPr>
           </a:lstStyle>
           <a:p>
@@ -2808,6 +2767,7 @@
               <a:rPr lang="en-US"/>
               <a:t>Click to edit Master title style</a:t>
             </a:r>
+            <a:endParaRPr lang="en-US"/>
           </a:p>
         </p:txBody>
       </p:sp>
@@ -2831,31 +2791,31 @@
           <a:bodyPr/>
           <a:lstStyle>
             <a:lvl1pPr>
-              <a:defRPr sz="4267"/>
+              <a:defRPr sz="4265"/>
             </a:lvl1pPr>
             <a:lvl2pPr>
-              <a:defRPr sz="3733"/>
+              <a:defRPr sz="3735"/>
             </a:lvl2pPr>
             <a:lvl3pPr>
               <a:defRPr sz="3200"/>
             </a:lvl3pPr>
             <a:lvl4pPr>
-              <a:defRPr sz="2667"/>
+              <a:defRPr sz="2665"/>
             </a:lvl4pPr>
             <a:lvl5pPr>
-              <a:defRPr sz="2667"/>
+              <a:defRPr sz="2665"/>
             </a:lvl5pPr>
             <a:lvl6pPr>
-              <a:defRPr sz="2667"/>
+              <a:defRPr sz="2665"/>
             </a:lvl6pPr>
             <a:lvl7pPr>
-              <a:defRPr sz="2667"/>
+              <a:defRPr sz="2665"/>
             </a:lvl7pPr>
             <a:lvl8pPr>
-              <a:defRPr sz="2667"/>
+              <a:defRPr sz="2665"/>
             </a:lvl8pPr>
             <a:lvl9pPr>
-              <a:defRPr sz="2667"/>
+              <a:defRPr sz="2665"/>
             </a:lvl9pPr>
           </a:lstStyle>
           <a:p>
@@ -2864,6 +2824,7 @@
               <a:rPr lang="en-US"/>
               <a:t>Click to edit Master text styles</a:t>
             </a:r>
+            <a:endParaRPr lang="en-US"/>
           </a:p>
           <a:p>
             <a:pPr lvl="1"/>
@@ -2871,6 +2832,7 @@
               <a:rPr lang="en-US"/>
               <a:t>Second level</a:t>
             </a:r>
+            <a:endParaRPr lang="en-US"/>
           </a:p>
           <a:p>
             <a:pPr lvl="2"/>
@@ -2878,6 +2840,7 @@
               <a:rPr lang="en-US"/>
               <a:t>Third level</a:t>
             </a:r>
+            <a:endParaRPr lang="en-US"/>
           </a:p>
           <a:p>
             <a:pPr lvl="3"/>
@@ -2885,6 +2848,7 @@
               <a:rPr lang="en-US"/>
               <a:t>Fourth level</a:t>
             </a:r>
+            <a:endParaRPr lang="en-US"/>
           </a:p>
           <a:p>
             <a:pPr lvl="4"/>
@@ -2892,6 +2856,7 @@
               <a:rPr lang="en-US"/>
               <a:t>Fifth level</a:t>
             </a:r>
+            <a:endParaRPr lang="en-US"/>
           </a:p>
         </p:txBody>
       </p:sp>
@@ -2916,37 +2881,37 @@
           <a:lstStyle>
             <a:lvl1pPr marL="0" indent="0">
               <a:buNone/>
-              <a:defRPr sz="1867"/>
+              <a:defRPr sz="1865"/>
             </a:lvl1pPr>
-            <a:lvl2pPr marL="609585" indent="0">
+            <a:lvl2pPr marL="609600" indent="0">
               <a:buNone/>
               <a:defRPr sz="1600"/>
             </a:lvl2pPr>
-            <a:lvl3pPr marL="1219170" indent="0">
-              <a:buNone/>
-              <a:defRPr sz="1333"/>
+            <a:lvl3pPr marL="1219200" indent="0">
+              <a:buNone/>
+              <a:defRPr sz="1335"/>
             </a:lvl3pPr>
-            <a:lvl4pPr marL="1828754" indent="0">
+            <a:lvl4pPr marL="1828800" indent="0">
               <a:buNone/>
               <a:defRPr sz="1200"/>
             </a:lvl4pPr>
-            <a:lvl5pPr marL="2438339" indent="0">
+            <a:lvl5pPr marL="2438400" indent="0">
               <a:buNone/>
               <a:defRPr sz="1200"/>
             </a:lvl5pPr>
-            <a:lvl6pPr marL="3047924" indent="0">
+            <a:lvl6pPr marL="3048000" indent="0">
               <a:buNone/>
               <a:defRPr sz="1200"/>
             </a:lvl6pPr>
-            <a:lvl7pPr marL="3657509" indent="0">
+            <a:lvl7pPr marL="3657600" indent="0">
               <a:buNone/>
               <a:defRPr sz="1200"/>
             </a:lvl7pPr>
-            <a:lvl8pPr marL="4267093" indent="0">
+            <a:lvl8pPr marL="4267200" indent="0">
               <a:buNone/>
               <a:defRPr sz="1200"/>
             </a:lvl8pPr>
-            <a:lvl9pPr marL="4876678" indent="0">
+            <a:lvl9pPr marL="4876800" indent="0">
               <a:buNone/>
               <a:defRPr sz="1200"/>
             </a:lvl9pPr>
@@ -2957,6 +2922,7 @@
               <a:rPr lang="en-US"/>
               <a:t>Click to edit Master text styles</a:t>
             </a:r>
+            <a:endParaRPr lang="en-US"/>
           </a:p>
         </p:txBody>
       </p:sp>
@@ -2977,7 +2943,6 @@
           <a:p>
             <a:fld id="{62D6E202-B606-4609-B914-27C9371A1F6D}" type="datetime1">
               <a:rPr lang="en-US" smtClean="0"/>
-              <a:t>8/19/2020</a:t>
             </a:fld>
             <a:endParaRPr lang="en-US" dirty="0"/>
           </a:p>
@@ -3019,18 +2984,12 @@
           <a:p>
             <a:fld id="{3A98EE3D-8CD1-4C3F-BD1C-C98C9596463C}" type="slidenum">
               <a:rPr lang="en-US" smtClean="0"/>
-              <a:t>‹#›</a:t>
             </a:fld>
             <a:endParaRPr lang="en-US" dirty="0"/>
           </a:p>
         </p:txBody>
       </p:sp>
     </p:spTree>
-    <p:extLst>
-      <p:ext uri="{BB962C8B-B14F-4D97-AF65-F5344CB8AC3E}">
-        <p14:creationId xmlns:p14="http://schemas.microsoft.com/office/powerpoint/2010/main" val="188874071"/>
-      </p:ext>
-    </p:extLst>
   </p:cSld>
   <p:clrMapOvr>
     <a:masterClrMapping/>
@@ -3045,7 +3004,7 @@
     <p:bg>
       <p:bgPr>
         <a:blipFill dpi="0" rotWithShape="1">
-          <a:blip r:embed="rId14">
+          <a:blip r:embed="rId13">
             <a:lum/>
           </a:blip>
           <a:srcRect/>
@@ -3099,6 +3058,7 @@
               <a:rPr lang="en-US"/>
               <a:t>Click to edit Master title style</a:t>
             </a:r>
+            <a:endParaRPr lang="en-US"/>
           </a:p>
         </p:txBody>
       </p:sp>
@@ -3132,6 +3092,7 @@
               <a:rPr lang="en-US"/>
               <a:t>Click to edit Master text styles</a:t>
             </a:r>
+            <a:endParaRPr lang="en-US"/>
           </a:p>
           <a:p>
             <a:pPr lvl="1"/>
@@ -3139,6 +3100,7 @@
               <a:rPr lang="en-US"/>
               <a:t>Second level</a:t>
             </a:r>
+            <a:endParaRPr lang="en-US"/>
           </a:p>
           <a:p>
             <a:pPr lvl="2"/>
@@ -3146,6 +3108,7 @@
               <a:rPr lang="en-US"/>
               <a:t>Third level</a:t>
             </a:r>
+            <a:endParaRPr lang="en-US"/>
           </a:p>
           <a:p>
             <a:pPr lvl="3"/>
@@ -3153,6 +3116,7 @@
               <a:rPr lang="en-US"/>
               <a:t>Fourth level</a:t>
             </a:r>
+            <a:endParaRPr lang="en-US"/>
           </a:p>
           <a:p>
             <a:pPr lvl="4"/>
@@ -3160,6 +3124,7 @@
               <a:rPr lang="en-US"/>
               <a:t>Fifth level</a:t>
             </a:r>
+            <a:endParaRPr lang="en-US"/>
           </a:p>
         </p:txBody>
       </p:sp>
@@ -3198,7 +3163,6 @@
           <a:p>
             <a:fld id="{62D6E202-B606-4609-B914-27C9371A1F6D}" type="datetime1">
               <a:rPr lang="en-US" smtClean="0"/>
-              <a:t>8/19/2020</a:t>
             </a:fld>
             <a:endParaRPr lang="en-US" dirty="0"/>
           </a:p>
@@ -3276,7 +3240,6 @@
           <a:p>
             <a:fld id="{3A98EE3D-8CD1-4C3F-BD1C-C98C9596463C}" type="slidenum">
               <a:rPr lang="en-US" smtClean="0"/>
-              <a:t>‹#›</a:t>
             </a:fld>
             <a:endParaRPr lang="en-US" dirty="0"/>
           </a:p>
@@ -3284,13 +3247,7 @@
       </p:sp>
       <p:sp>
         <p:nvSpPr>
-          <p:cNvPr id="7" name="TextBox 6">
-            <a:extLst>
-              <a:ext uri="{FF2B5EF4-FFF2-40B4-BE49-F238E27FC236}">
-                <a16:creationId xmlns:a16="http://schemas.microsoft.com/office/drawing/2014/main" id="{5831A581-D9EB-4C3E-A08F-5E96D9D31F1E}"/>
-              </a:ext>
-            </a:extLst>
-          </p:cNvPr>
+          <p:cNvPr id="7" name="TextBox 6"/>
           <p:cNvSpPr txBox="1"/>
           <p:nvPr/>
         </p:nvSpPr>
@@ -3311,7 +3268,7 @@
           <a:lstStyle/>
           <a:p>
             <a:r>
-              <a:rPr lang="en-US" sz="1867">
+              <a:rPr lang="en-US" sz="1865">
                 <a:solidFill>
                   <a:schemeClr val="bg1">
                     <a:lumMod val="65000"/>
@@ -3320,10 +3277,17 @@
               </a:rPr>
               <a:t>This presentation uses a free template provided by FPPT.com</a:t>
             </a:r>
-          </a:p>
-          <a:p>
-            <a:r>
-              <a:rPr lang="en-US" sz="1867">
+            <a:endParaRPr lang="en-US" sz="1865">
+              <a:solidFill>
+                <a:schemeClr val="bg1">
+                  <a:lumMod val="65000"/>
+                </a:schemeClr>
+              </a:solidFill>
+            </a:endParaRPr>
+          </a:p>
+          <a:p>
+            <a:r>
+              <a:rPr lang="en-US" sz="1865">
                 <a:solidFill>
                   <a:schemeClr val="bg1">
                     <a:lumMod val="65000"/>
@@ -3332,40 +3296,42 @@
               </a:rPr>
               <a:t>www.free-power-point-templates.com</a:t>
             </a:r>
+            <a:endParaRPr lang="en-US" sz="1865">
+              <a:solidFill>
+                <a:schemeClr val="bg1">
+                  <a:lumMod val="65000"/>
+                </a:schemeClr>
+              </a:solidFill>
+            </a:endParaRPr>
           </a:p>
         </p:txBody>
       </p:sp>
     </p:spTree>
-    <p:extLst>
-      <p:ext uri="{BB962C8B-B14F-4D97-AF65-F5344CB8AC3E}">
-        <p14:creationId xmlns:p14="http://schemas.microsoft.com/office/powerpoint/2010/main" val="2871983671"/>
-      </p:ext>
-    </p:extLst>
   </p:cSld>
   <p:clrMap bg1="lt1" tx1="dk1" bg2="lt2" tx2="dk2" accent1="accent1" accent2="accent2" accent3="accent3" accent4="accent4" accent5="accent5" accent6="accent6" hlink="hlink" folHlink="folHlink"/>
   <p:sldLayoutIdLst>
-    <p:sldLayoutId id="2147484181" r:id="rId1"/>
-    <p:sldLayoutId id="2147484182" r:id="rId2"/>
-    <p:sldLayoutId id="2147484183" r:id="rId3"/>
-    <p:sldLayoutId id="2147484184" r:id="rId4"/>
-    <p:sldLayoutId id="2147484185" r:id="rId5"/>
-    <p:sldLayoutId id="2147484186" r:id="rId6"/>
-    <p:sldLayoutId id="2147484187" r:id="rId7"/>
-    <p:sldLayoutId id="2147484188" r:id="rId8"/>
-    <p:sldLayoutId id="2147484189" r:id="rId9"/>
-    <p:sldLayoutId id="2147484190" r:id="rId10"/>
-    <p:sldLayoutId id="2147484191" r:id="rId11"/>
-    <p:sldLayoutId id="2147484192" r:id="rId12"/>
+    <p:sldLayoutId id="2147483649" r:id="rId1"/>
+    <p:sldLayoutId id="2147483650" r:id="rId2"/>
+    <p:sldLayoutId id="2147483651" r:id="rId3"/>
+    <p:sldLayoutId id="2147483652" r:id="rId4"/>
+    <p:sldLayoutId id="2147483653" r:id="rId5"/>
+    <p:sldLayoutId id="2147483654" r:id="rId6"/>
+    <p:sldLayoutId id="2147483655" r:id="rId7"/>
+    <p:sldLayoutId id="2147483656" r:id="rId8"/>
+    <p:sldLayoutId id="2147483657" r:id="rId9"/>
+    <p:sldLayoutId id="2147483658" r:id="rId10"/>
+    <p:sldLayoutId id="2147483659" r:id="rId11"/>
+    <p:sldLayoutId id="2147483660" r:id="rId12"/>
   </p:sldLayoutIdLst>
   <p:hf sldNum="0" hdr="0" ftr="0" dt="0"/>
   <p:txStyles>
     <p:titleStyle>
-      <a:lvl1pPr algn="ctr" defTabSz="1219170" rtl="0" eaLnBrk="1" latinLnBrk="0" hangingPunct="1">
+      <a:lvl1pPr algn="ctr" defTabSz="1219200" rtl="0" eaLnBrk="1" latinLnBrk="0" hangingPunct="1">
         <a:spcBef>
           <a:spcPct val="0"/>
         </a:spcBef>
         <a:buNone/>
-        <a:defRPr sz="5867" kern="1200">
+        <a:defRPr sz="5865" kern="1200">
           <a:solidFill>
             <a:schemeClr val="tx1"/>
           </a:solidFill>
@@ -3376,13 +3342,13 @@
       </a:lvl1pPr>
     </p:titleStyle>
     <p:bodyStyle>
-      <a:lvl1pPr marL="457189" indent="-457189" algn="l" defTabSz="1219170" rtl="0" eaLnBrk="1" latinLnBrk="0" hangingPunct="1">
+      <a:lvl1pPr marL="457200" indent="-457200" algn="l" defTabSz="1219200" rtl="0" eaLnBrk="1" latinLnBrk="0" hangingPunct="1">
         <a:spcBef>
           <a:spcPct val="20000"/>
         </a:spcBef>
-        <a:buFont typeface="Arial" pitchFamily="34" charset="0"/>
+        <a:buFont typeface="Arial" panose="020B0604020202020204" pitchFamily="34" charset="0"/>
         <a:buChar char="•"/>
-        <a:defRPr sz="4267" kern="1200">
+        <a:defRPr sz="4265" kern="1200">
           <a:solidFill>
             <a:schemeClr val="tx1"/>
           </a:solidFill>
@@ -3391,13 +3357,13 @@
           <a:cs typeface="+mn-cs"/>
         </a:defRPr>
       </a:lvl1pPr>
-      <a:lvl2pPr marL="990575" indent="-380990" algn="l" defTabSz="1219170" rtl="0" eaLnBrk="1" latinLnBrk="0" hangingPunct="1">
+      <a:lvl2pPr marL="990600" indent="-381000" algn="l" defTabSz="1219200" rtl="0" eaLnBrk="1" latinLnBrk="0" hangingPunct="1">
         <a:spcBef>
           <a:spcPct val="20000"/>
         </a:spcBef>
-        <a:buFont typeface="Arial" pitchFamily="34" charset="0"/>
+        <a:buFont typeface="Arial" panose="020B0604020202020204" pitchFamily="34" charset="0"/>
         <a:buChar char="–"/>
-        <a:defRPr sz="3733" kern="1200">
+        <a:defRPr sz="3735" kern="1200">
           <a:solidFill>
             <a:schemeClr val="tx1"/>
           </a:solidFill>
@@ -3406,11 +3372,11 @@
           <a:cs typeface="+mn-cs"/>
         </a:defRPr>
       </a:lvl2pPr>
-      <a:lvl3pPr marL="1523962" indent="-304792" algn="l" defTabSz="1219170" rtl="0" eaLnBrk="1" latinLnBrk="0" hangingPunct="1">
+      <a:lvl3pPr marL="1524000" indent="-304800" algn="l" defTabSz="1219200" rtl="0" eaLnBrk="1" latinLnBrk="0" hangingPunct="1">
         <a:spcBef>
           <a:spcPct val="20000"/>
         </a:spcBef>
-        <a:buFont typeface="Arial" pitchFamily="34" charset="0"/>
+        <a:buFont typeface="Arial" panose="020B0604020202020204" pitchFamily="34" charset="0"/>
         <a:buChar char="•"/>
         <a:defRPr sz="3200" kern="1200">
           <a:solidFill>
@@ -3421,13 +3387,13 @@
           <a:cs typeface="+mn-cs"/>
         </a:defRPr>
       </a:lvl3pPr>
-      <a:lvl4pPr marL="2133547" indent="-304792" algn="l" defTabSz="1219170" rtl="0" eaLnBrk="1" latinLnBrk="0" hangingPunct="1">
+      <a:lvl4pPr marL="2133600" indent="-304800" algn="l" defTabSz="1219200" rtl="0" eaLnBrk="1" latinLnBrk="0" hangingPunct="1">
         <a:spcBef>
           <a:spcPct val="20000"/>
         </a:spcBef>
-        <a:buFont typeface="Arial" pitchFamily="34" charset="0"/>
+        <a:buFont typeface="Arial" panose="020B0604020202020204" pitchFamily="34" charset="0"/>
         <a:buChar char="–"/>
-        <a:defRPr sz="2667" kern="1200">
+        <a:defRPr sz="2665" kern="1200">
           <a:solidFill>
             <a:schemeClr val="tx1"/>
           </a:solidFill>
@@ -3436,13 +3402,13 @@
           <a:cs typeface="+mn-cs"/>
         </a:defRPr>
       </a:lvl4pPr>
-      <a:lvl5pPr marL="2743131" indent="-304792" algn="l" defTabSz="1219170" rtl="0" eaLnBrk="1" latinLnBrk="0" hangingPunct="1">
+      <a:lvl5pPr marL="2743200" indent="-304800" algn="l" defTabSz="1219200" rtl="0" eaLnBrk="1" latinLnBrk="0" hangingPunct="1">
         <a:spcBef>
           <a:spcPct val="20000"/>
         </a:spcBef>
-        <a:buFont typeface="Arial" pitchFamily="34" charset="0"/>
+        <a:buFont typeface="Arial" panose="020B0604020202020204" pitchFamily="34" charset="0"/>
         <a:buChar char="»"/>
-        <a:defRPr sz="2667" kern="1200">
+        <a:defRPr sz="2665" kern="1200">
           <a:solidFill>
             <a:schemeClr val="tx1"/>
           </a:solidFill>
@@ -3451,13 +3417,13 @@
           <a:cs typeface="+mn-cs"/>
         </a:defRPr>
       </a:lvl5pPr>
-      <a:lvl6pPr marL="3352716" indent="-304792" algn="l" defTabSz="1219170" rtl="0" eaLnBrk="1" latinLnBrk="0" hangingPunct="1">
+      <a:lvl6pPr marL="3352800" indent="-304800" algn="l" defTabSz="1219200" rtl="0" eaLnBrk="1" latinLnBrk="0" hangingPunct="1">
         <a:spcBef>
           <a:spcPct val="20000"/>
         </a:spcBef>
-        <a:buFont typeface="Arial" pitchFamily="34" charset="0"/>
+        <a:buFont typeface="Arial" panose="020B0604020202020204" pitchFamily="34" charset="0"/>
         <a:buChar char="•"/>
-        <a:defRPr sz="2667" kern="1200">
+        <a:defRPr sz="2665" kern="1200">
           <a:solidFill>
             <a:schemeClr val="tx1"/>
           </a:solidFill>
@@ -3466,13 +3432,13 @@
           <a:cs typeface="+mn-cs"/>
         </a:defRPr>
       </a:lvl6pPr>
-      <a:lvl7pPr marL="3962301" indent="-304792" algn="l" defTabSz="1219170" rtl="0" eaLnBrk="1" latinLnBrk="0" hangingPunct="1">
+      <a:lvl7pPr marL="3962400" indent="-304800" algn="l" defTabSz="1219200" rtl="0" eaLnBrk="1" latinLnBrk="0" hangingPunct="1">
         <a:spcBef>
           <a:spcPct val="20000"/>
         </a:spcBef>
-        <a:buFont typeface="Arial" pitchFamily="34" charset="0"/>
+        <a:buFont typeface="Arial" panose="020B0604020202020204" pitchFamily="34" charset="0"/>
         <a:buChar char="•"/>
-        <a:defRPr sz="2667" kern="1200">
+        <a:defRPr sz="2665" kern="1200">
           <a:solidFill>
             <a:schemeClr val="tx1"/>
           </a:solidFill>
@@ -3481,13 +3447,13 @@
           <a:cs typeface="+mn-cs"/>
         </a:defRPr>
       </a:lvl7pPr>
-      <a:lvl8pPr marL="4571886" indent="-304792" algn="l" defTabSz="1219170" rtl="0" eaLnBrk="1" latinLnBrk="0" hangingPunct="1">
+      <a:lvl8pPr marL="4572000" indent="-304800" algn="l" defTabSz="1219200" rtl="0" eaLnBrk="1" latinLnBrk="0" hangingPunct="1">
         <a:spcBef>
           <a:spcPct val="20000"/>
         </a:spcBef>
-        <a:buFont typeface="Arial" pitchFamily="34" charset="0"/>
+        <a:buFont typeface="Arial" panose="020B0604020202020204" pitchFamily="34" charset="0"/>
         <a:buChar char="•"/>
-        <a:defRPr sz="2667" kern="1200">
+        <a:defRPr sz="2665" kern="1200">
           <a:solidFill>
             <a:schemeClr val="tx1"/>
           </a:solidFill>
@@ -3496,13 +3462,13 @@
           <a:cs typeface="+mn-cs"/>
         </a:defRPr>
       </a:lvl8pPr>
-      <a:lvl9pPr marL="5181470" indent="-304792" algn="l" defTabSz="1219170" rtl="0" eaLnBrk="1" latinLnBrk="0" hangingPunct="1">
+      <a:lvl9pPr marL="5181600" indent="-304800" algn="l" defTabSz="1219200" rtl="0" eaLnBrk="1" latinLnBrk="0" hangingPunct="1">
         <a:spcBef>
           <a:spcPct val="20000"/>
         </a:spcBef>
-        <a:buFont typeface="Arial" pitchFamily="34" charset="0"/>
+        <a:buFont typeface="Arial" panose="020B0604020202020204" pitchFamily="34" charset="0"/>
         <a:buChar char="•"/>
-        <a:defRPr sz="2667" kern="1200">
+        <a:defRPr sz="2665" kern="1200">
           <a:solidFill>
             <a:schemeClr val="tx1"/>
           </a:solidFill>
@@ -3516,7 +3482,7 @@
       <a:defPPr>
         <a:defRPr lang="en-US"/>
       </a:defPPr>
-      <a:lvl1pPr marL="0" algn="l" defTabSz="1219170" rtl="0" eaLnBrk="1" latinLnBrk="0" hangingPunct="1">
+      <a:lvl1pPr marL="0" algn="l" defTabSz="1219200" rtl="0" eaLnBrk="1" latinLnBrk="0" hangingPunct="1">
         <a:defRPr sz="2400" kern="1200">
           <a:solidFill>
             <a:schemeClr val="tx1"/>
@@ -3526,7 +3492,7 @@
           <a:cs typeface="+mn-cs"/>
         </a:defRPr>
       </a:lvl1pPr>
-      <a:lvl2pPr marL="609585" algn="l" defTabSz="1219170" rtl="0" eaLnBrk="1" latinLnBrk="0" hangingPunct="1">
+      <a:lvl2pPr marL="609600" algn="l" defTabSz="1219200" rtl="0" eaLnBrk="1" latinLnBrk="0" hangingPunct="1">
         <a:defRPr sz="2400" kern="1200">
           <a:solidFill>
             <a:schemeClr val="tx1"/>
@@ -3536,7 +3502,7 @@
           <a:cs typeface="+mn-cs"/>
         </a:defRPr>
       </a:lvl2pPr>
-      <a:lvl3pPr marL="1219170" algn="l" defTabSz="1219170" rtl="0" eaLnBrk="1" latinLnBrk="0" hangingPunct="1">
+      <a:lvl3pPr marL="1219200" algn="l" defTabSz="1219200" rtl="0" eaLnBrk="1" latinLnBrk="0" hangingPunct="1">
         <a:defRPr sz="2400" kern="1200">
           <a:solidFill>
             <a:schemeClr val="tx1"/>
@@ -3546,7 +3512,7 @@
           <a:cs typeface="+mn-cs"/>
         </a:defRPr>
       </a:lvl3pPr>
-      <a:lvl4pPr marL="1828754" algn="l" defTabSz="1219170" rtl="0" eaLnBrk="1" latinLnBrk="0" hangingPunct="1">
+      <a:lvl4pPr marL="1828800" algn="l" defTabSz="1219200" rtl="0" eaLnBrk="1" latinLnBrk="0" hangingPunct="1">
         <a:defRPr sz="2400" kern="1200">
           <a:solidFill>
             <a:schemeClr val="tx1"/>
@@ -3556,7 +3522,7 @@
           <a:cs typeface="+mn-cs"/>
         </a:defRPr>
       </a:lvl4pPr>
-      <a:lvl5pPr marL="2438339" algn="l" defTabSz="1219170" rtl="0" eaLnBrk="1" latinLnBrk="0" hangingPunct="1">
+      <a:lvl5pPr marL="2438400" algn="l" defTabSz="1219200" rtl="0" eaLnBrk="1" latinLnBrk="0" hangingPunct="1">
         <a:defRPr sz="2400" kern="1200">
           <a:solidFill>
             <a:schemeClr val="tx1"/>
@@ -3566,7 +3532,7 @@
           <a:cs typeface="+mn-cs"/>
         </a:defRPr>
       </a:lvl5pPr>
-      <a:lvl6pPr marL="3047924" algn="l" defTabSz="1219170" rtl="0" eaLnBrk="1" latinLnBrk="0" hangingPunct="1">
+      <a:lvl6pPr marL="3048000" algn="l" defTabSz="1219200" rtl="0" eaLnBrk="1" latinLnBrk="0" hangingPunct="1">
         <a:defRPr sz="2400" kern="1200">
           <a:solidFill>
             <a:schemeClr val="tx1"/>
@@ -3576,7 +3542,7 @@
           <a:cs typeface="+mn-cs"/>
         </a:defRPr>
       </a:lvl6pPr>
-      <a:lvl7pPr marL="3657509" algn="l" defTabSz="1219170" rtl="0" eaLnBrk="1" latinLnBrk="0" hangingPunct="1">
+      <a:lvl7pPr marL="3657600" algn="l" defTabSz="1219200" rtl="0" eaLnBrk="1" latinLnBrk="0" hangingPunct="1">
         <a:defRPr sz="2400" kern="1200">
           <a:solidFill>
             <a:schemeClr val="tx1"/>
@@ -3586,7 +3552,7 @@
           <a:cs typeface="+mn-cs"/>
         </a:defRPr>
       </a:lvl7pPr>
-      <a:lvl8pPr marL="4267093" algn="l" defTabSz="1219170" rtl="0" eaLnBrk="1" latinLnBrk="0" hangingPunct="1">
+      <a:lvl8pPr marL="4267200" algn="l" defTabSz="1219200" rtl="0" eaLnBrk="1" latinLnBrk="0" hangingPunct="1">
         <a:defRPr sz="2400" kern="1200">
           <a:solidFill>
             <a:schemeClr val="tx1"/>
@@ -3596,7 +3562,7 @@
           <a:cs typeface="+mn-cs"/>
         </a:defRPr>
       </a:lvl8pPr>
-      <a:lvl9pPr marL="4876678" algn="l" defTabSz="1219170" rtl="0" eaLnBrk="1" latinLnBrk="0" hangingPunct="1">
+      <a:lvl9pPr marL="4876800" algn="l" defTabSz="1219200" rtl="0" eaLnBrk="1" latinLnBrk="0" hangingPunct="1">
         <a:defRPr sz="2400" kern="1200">
           <a:solidFill>
             <a:schemeClr val="tx1"/>
@@ -3630,13 +3596,7 @@
       </p:grpSpPr>
       <p:sp>
         <p:nvSpPr>
-          <p:cNvPr id="3" name="Rectangle: Rounded Corners 2">
-            <a:extLst>
-              <a:ext uri="{FF2B5EF4-FFF2-40B4-BE49-F238E27FC236}">
-                <a16:creationId xmlns:a16="http://schemas.microsoft.com/office/drawing/2014/main" id="{E5A4D6B9-8E0B-4846-9F33-186F42325BD2}"/>
-              </a:ext>
-            </a:extLst>
-          </p:cNvPr>
+          <p:cNvPr id="3" name="Rectangle: Rounded Corners 2"/>
           <p:cNvSpPr/>
           <p:nvPr/>
         </p:nvSpPr>
@@ -3684,13 +3644,7 @@
       </p:sp>
       <p:sp>
         <p:nvSpPr>
-          <p:cNvPr id="5" name="Title 4">
-            <a:extLst>
-              <a:ext uri="{FF2B5EF4-FFF2-40B4-BE49-F238E27FC236}">
-                <a16:creationId xmlns:a16="http://schemas.microsoft.com/office/drawing/2014/main" id="{3EAAAB52-D31A-47E3-ADF5-CF49D5C6BEF8}"/>
-              </a:ext>
-            </a:extLst>
-          </p:cNvPr>
+          <p:cNvPr id="5" name="Title 4"/>
           <p:cNvSpPr>
             <a:spLocks noGrp="1"/>
           </p:cNvSpPr>
@@ -3729,18 +3683,27 @@
               </a:rPr>
               <a:t>RECIPE FINDER</a:t>
             </a:r>
-          </a:p>
-        </p:txBody>
-      </p:sp>
-      <p:sp>
-        <p:nvSpPr>
-          <p:cNvPr id="6" name="Subtitle 5">
-            <a:extLst>
-              <a:ext uri="{FF2B5EF4-FFF2-40B4-BE49-F238E27FC236}">
-                <a16:creationId xmlns:a16="http://schemas.microsoft.com/office/drawing/2014/main" id="{B0E48DCC-BAC8-4895-9B47-B676425F586F}"/>
-              </a:ext>
-            </a:extLst>
-          </p:cNvPr>
+            <a:endParaRPr lang="en-IN" sz="8800" b="1" spc="50" dirty="0">
+              <a:ln w="0"/>
+              <a:solidFill>
+                <a:schemeClr val="bg1">
+                  <a:lumMod val="95000"/>
+                </a:schemeClr>
+              </a:solidFill>
+              <a:effectLst>
+                <a:innerShdw blurRad="63500" dist="50800" dir="13500000">
+                  <a:srgbClr val="000000">
+                    <a:alpha val="50000"/>
+                  </a:srgbClr>
+                </a:innerShdw>
+              </a:effectLst>
+            </a:endParaRPr>
+          </a:p>
+        </p:txBody>
+      </p:sp>
+      <p:sp>
+        <p:nvSpPr>
+          <p:cNvPr id="6" name="Subtitle 5"/>
           <p:cNvSpPr>
             <a:spLocks noGrp="1"/>
           </p:cNvSpPr>
@@ -3789,29 +3752,26 @@
               <a:rPr lang="en-IN" sz="3200" b="1" dirty="0"/>
               <a:t>- 19BCE1303</a:t>
             </a:r>
+            <a:endParaRPr lang="en-IN" sz="3200" b="1" dirty="0"/>
           </a:p>
           <a:p>
             <a:r>
               <a:rPr lang="en-IN" sz="3200" b="1" dirty="0"/>
-              <a:t>  Tejas </a:t>
+              <a:t>  Tejas V</a:t>
             </a:r>
             <a:r>
               <a:rPr lang="en-IN" sz="3200" b="1" dirty="0" err="1"/>
-              <a:t>vaichole</a:t>
+              <a:t>aichole</a:t>
             </a:r>
             <a:r>
               <a:rPr lang="en-IN" sz="3200" b="1" dirty="0"/>
               <a:t> – 19BCE1295</a:t>
             </a:r>
+            <a:endParaRPr lang="en-IN" sz="3200" b="1" dirty="0"/>
           </a:p>
         </p:txBody>
       </p:sp>
     </p:spTree>
-    <p:extLst>
-      <p:ext uri="{BB962C8B-B14F-4D97-AF65-F5344CB8AC3E}">
-        <p14:creationId xmlns:p14="http://schemas.microsoft.com/office/powerpoint/2010/main" val="495828369"/>
-      </p:ext>
-    </p:extLst>
   </p:cSld>
   <p:clrMapOvr>
     <a:masterClrMapping/>
@@ -3838,13 +3798,7 @@
       </p:grpSpPr>
       <p:sp>
         <p:nvSpPr>
-          <p:cNvPr id="3" name="Content Placeholder 2">
-            <a:extLst>
-              <a:ext uri="{FF2B5EF4-FFF2-40B4-BE49-F238E27FC236}">
-                <a16:creationId xmlns:a16="http://schemas.microsoft.com/office/drawing/2014/main" id="{E3B3D61C-EBB0-48A8-9E27-1F4540C94B84}"/>
-              </a:ext>
-            </a:extLst>
-          </p:cNvPr>
+          <p:cNvPr id="3" name="Content Placeholder 2"/>
           <p:cNvSpPr>
             <a:spLocks noGrp="1"/>
           </p:cNvSpPr>
@@ -3877,6 +3831,7 @@
               <a:rPr lang="en-IN" sz="3500" dirty="0"/>
               <a:t>Edit/Modify page where the user can update or modify his/her previously uploaded recipe.</a:t>
             </a:r>
+            <a:endParaRPr lang="en-IN" sz="3500" dirty="0"/>
           </a:p>
           <a:p>
             <a:pPr algn="l"/>
@@ -3892,6 +3847,7 @@
               <a:rPr lang="en-IN" sz="3500" dirty="0"/>
               <a:t>User Account page to show his/her previous uploaded recipes.</a:t>
             </a:r>
+            <a:endParaRPr lang="en-IN" sz="3500" dirty="0"/>
           </a:p>
           <a:p>
             <a:pPr algn="l"/>
@@ -3907,6 +3863,7 @@
               <a:rPr lang="en-IN" sz="3500" dirty="0"/>
               <a:t>Contact page where an unregistered user can contact the user who posted a particular recipe through chat via the portal to suggest some improvisations.</a:t>
             </a:r>
+            <a:endParaRPr lang="en-IN" sz="3500" dirty="0"/>
           </a:p>
           <a:p>
             <a:pPr algn="l"/>
@@ -3922,6 +3879,7 @@
               <a:rPr lang="en-IN" sz="3500" dirty="0"/>
               <a:t>Help page.</a:t>
             </a:r>
+            <a:endParaRPr lang="en-IN" sz="3500" dirty="0"/>
           </a:p>
           <a:p>
             <a:endParaRPr lang="en-IN" dirty="0"/>
@@ -3929,11 +3887,6 @@
         </p:txBody>
       </p:sp>
     </p:spTree>
-    <p:extLst>
-      <p:ext uri="{BB962C8B-B14F-4D97-AF65-F5344CB8AC3E}">
-        <p14:creationId xmlns:p14="http://schemas.microsoft.com/office/powerpoint/2010/main" val="3470531090"/>
-      </p:ext>
-    </p:extLst>
   </p:cSld>
   <p:clrMapOvr>
     <a:masterClrMapping/>
@@ -3960,13 +3913,7 @@
       </p:grpSpPr>
       <p:sp>
         <p:nvSpPr>
-          <p:cNvPr id="2" name="Title 1">
-            <a:extLst>
-              <a:ext uri="{FF2B5EF4-FFF2-40B4-BE49-F238E27FC236}">
-                <a16:creationId xmlns:a16="http://schemas.microsoft.com/office/drawing/2014/main" id="{977F98EB-C41E-40EB-8DD4-52D92BC3F656}"/>
-              </a:ext>
-            </a:extLst>
-          </p:cNvPr>
+          <p:cNvPr id="2" name="Title 1"/>
           <p:cNvSpPr>
             <a:spLocks noGrp="1"/>
           </p:cNvSpPr>
@@ -4007,15 +3954,28 @@
               </a:rPr>
               <a:t>THANK YOU</a:t>
             </a:r>
+            <a:endParaRPr lang="en-IN" sz="6600" b="1" dirty="0">
+              <a:ln w="9525">
+                <a:solidFill>
+                  <a:schemeClr val="bg1"/>
+                </a:solidFill>
+                <a:prstDash val="solid"/>
+              </a:ln>
+              <a:solidFill>
+                <a:schemeClr val="tx1"/>
+              </a:solidFill>
+              <a:effectLst>
+                <a:outerShdw blurRad="12700" dist="38100" dir="2700000" algn="tl" rotWithShape="0">
+                  <a:schemeClr val="bg1">
+                    <a:lumMod val="50000"/>
+                  </a:schemeClr>
+                </a:outerShdw>
+              </a:effectLst>
+            </a:endParaRPr>
           </a:p>
         </p:txBody>
       </p:sp>
     </p:spTree>
-    <p:extLst>
-      <p:ext uri="{BB962C8B-B14F-4D97-AF65-F5344CB8AC3E}">
-        <p14:creationId xmlns:p14="http://schemas.microsoft.com/office/powerpoint/2010/main" val="1661728492"/>
-      </p:ext>
-    </p:extLst>
   </p:cSld>
   <p:clrMapOvr>
     <a:masterClrMapping/>
@@ -4042,13 +4002,7 @@
       </p:grpSpPr>
       <p:sp>
         <p:nvSpPr>
-          <p:cNvPr id="5" name="Rectangle 4">
-            <a:extLst>
-              <a:ext uri="{FF2B5EF4-FFF2-40B4-BE49-F238E27FC236}">
-                <a16:creationId xmlns:a16="http://schemas.microsoft.com/office/drawing/2014/main" id="{E21AF8B2-2B86-4086-BA38-F95D4C2502A1}"/>
-              </a:ext>
-            </a:extLst>
-          </p:cNvPr>
+          <p:cNvPr id="5" name="Rectangle 4"/>
           <p:cNvSpPr/>
           <p:nvPr/>
         </p:nvSpPr>
@@ -4108,13 +4062,7 @@
       </p:sp>
       <p:sp>
         <p:nvSpPr>
-          <p:cNvPr id="2" name="Title 1">
-            <a:extLst>
-              <a:ext uri="{FF2B5EF4-FFF2-40B4-BE49-F238E27FC236}">
-                <a16:creationId xmlns:a16="http://schemas.microsoft.com/office/drawing/2014/main" id="{3BF4D158-4B62-4A18-9849-0EEFC24BA054}"/>
-              </a:ext>
-            </a:extLst>
-          </p:cNvPr>
+          <p:cNvPr id="2" name="Title 1"/>
           <p:cNvSpPr>
             <a:spLocks noGrp="1"/>
           </p:cNvSpPr>
@@ -4141,18 +4089,17 @@
               </a:rPr>
               <a:t>Problem statement</a:t>
             </a:r>
-          </a:p>
-        </p:txBody>
-      </p:sp>
-      <p:sp>
-        <p:nvSpPr>
-          <p:cNvPr id="3" name="Content Placeholder 2">
-            <a:extLst>
-              <a:ext uri="{FF2B5EF4-FFF2-40B4-BE49-F238E27FC236}">
-                <a16:creationId xmlns:a16="http://schemas.microsoft.com/office/drawing/2014/main" id="{9AA28B04-2550-4AF7-A0CE-178BF4E05E83}"/>
-              </a:ext>
-            </a:extLst>
-          </p:cNvPr>
+            <a:endParaRPr lang="en-IN" dirty="0">
+              <a:solidFill>
+                <a:srgbClr val="C00000"/>
+              </a:solidFill>
+            </a:endParaRPr>
+          </a:p>
+        </p:txBody>
+      </p:sp>
+      <p:sp>
+        <p:nvSpPr>
+          <p:cNvPr id="3" name="Content Placeholder 2"/>
           <p:cNvSpPr>
             <a:spLocks noGrp="1"/>
           </p:cNvSpPr>
@@ -4171,15 +4118,11 @@
               <a:rPr lang="en-IN" sz="3200" dirty="0"/>
               <a:t>Designing a user friendly web application that can list out recipes based upon the ingredients input by the user. Listing of recipes should be in such a way that recipes at top contain almost all the ingredients input by the user and recipe at the bottom should contain some extra or different ingredients apart from those input by the user. This app is very apt during this lockdown period as people who are left with minimal ingredients and don’t know what to cook, can find out and explore new recipes in this app.</a:t>
             </a:r>
+            <a:endParaRPr lang="en-IN" sz="3200" dirty="0"/>
           </a:p>
         </p:txBody>
       </p:sp>
     </p:spTree>
-    <p:extLst>
-      <p:ext uri="{BB962C8B-B14F-4D97-AF65-F5344CB8AC3E}">
-        <p14:creationId xmlns:p14="http://schemas.microsoft.com/office/powerpoint/2010/main" val="3420503168"/>
-      </p:ext>
-    </p:extLst>
   </p:cSld>
   <p:clrMapOvr>
     <a:masterClrMapping/>
@@ -4206,13 +4149,7 @@
       </p:grpSpPr>
       <p:sp>
         <p:nvSpPr>
-          <p:cNvPr id="5" name="Rectangle 4">
-            <a:extLst>
-              <a:ext uri="{FF2B5EF4-FFF2-40B4-BE49-F238E27FC236}">
-                <a16:creationId xmlns:a16="http://schemas.microsoft.com/office/drawing/2014/main" id="{8F5F9107-9451-4356-8EFA-94282F57FBBF}"/>
-              </a:ext>
-            </a:extLst>
-          </p:cNvPr>
+          <p:cNvPr id="5" name="Rectangle 4"/>
           <p:cNvSpPr/>
           <p:nvPr/>
         </p:nvSpPr>
@@ -4272,13 +4209,7 @@
       </p:sp>
       <p:sp>
         <p:nvSpPr>
-          <p:cNvPr id="2" name="Title 1">
-            <a:extLst>
-              <a:ext uri="{FF2B5EF4-FFF2-40B4-BE49-F238E27FC236}">
-                <a16:creationId xmlns:a16="http://schemas.microsoft.com/office/drawing/2014/main" id="{8C0A8052-212C-4C39-8672-1AA1904F3A4D}"/>
-              </a:ext>
-            </a:extLst>
-          </p:cNvPr>
+          <p:cNvPr id="2" name="Title 1"/>
           <p:cNvSpPr>
             <a:spLocks noGrp="1"/>
           </p:cNvSpPr>
@@ -4305,18 +4236,17 @@
               </a:rPr>
               <a:t>Description of project</a:t>
             </a:r>
-          </a:p>
-        </p:txBody>
-      </p:sp>
-      <p:sp>
-        <p:nvSpPr>
-          <p:cNvPr id="3" name="Content Placeholder 2">
-            <a:extLst>
-              <a:ext uri="{FF2B5EF4-FFF2-40B4-BE49-F238E27FC236}">
-                <a16:creationId xmlns:a16="http://schemas.microsoft.com/office/drawing/2014/main" id="{0805039B-7A4A-46C9-8F32-B493B585C67C}"/>
-              </a:ext>
-            </a:extLst>
-          </p:cNvPr>
+            <a:endParaRPr lang="en-IN" dirty="0">
+              <a:solidFill>
+                <a:srgbClr val="C00000"/>
+              </a:solidFill>
+            </a:endParaRPr>
+          </a:p>
+        </p:txBody>
+      </p:sp>
+      <p:sp>
+        <p:nvSpPr>
+          <p:cNvPr id="3" name="Content Placeholder 2"/>
           <p:cNvSpPr>
             <a:spLocks noGrp="1"/>
           </p:cNvSpPr>
@@ -4341,6 +4271,7 @@
               <a:rPr lang="en-IN" sz="4000" dirty="0"/>
               <a:t>We are designing a web app that can help people find out recipes based on their input ingredients.</a:t>
             </a:r>
+            <a:endParaRPr lang="en-IN" sz="4000" dirty="0"/>
           </a:p>
           <a:p>
             <a:pPr algn="l"/>
@@ -4348,6 +4279,7 @@
               <a:rPr lang="en-IN" sz="4000" dirty="0"/>
               <a:t>Visiting users who wish to find a recipe will have to enter the ingredients that they possess at their home.</a:t>
             </a:r>
+            <a:endParaRPr lang="en-IN" sz="4000" dirty="0"/>
           </a:p>
           <a:p>
             <a:pPr algn="l"/>
@@ -4355,6 +4287,7 @@
               <a:rPr lang="en-IN" sz="4000" dirty="0"/>
               <a:t>We will try to allow the user to input the ingredients in their native language and translate the name of the ingredient from native language to English using backend end script to search for the recipe.</a:t>
             </a:r>
+            <a:endParaRPr lang="en-IN" sz="4000" dirty="0"/>
           </a:p>
           <a:p>
             <a:pPr algn="l"/>
@@ -4362,6 +4295,7 @@
               <a:rPr lang="en-IN" sz="4000" dirty="0"/>
               <a:t>The input ingredients will be sent to the backend where an efficient algorithm will run to map the input ingredients with recipes.</a:t>
             </a:r>
+            <a:endParaRPr lang="en-IN" sz="4000" dirty="0"/>
           </a:p>
           <a:p>
             <a:pPr marL="0" indent="0">
@@ -4372,11 +4306,6 @@
         </p:txBody>
       </p:sp>
     </p:spTree>
-    <p:extLst>
-      <p:ext uri="{BB962C8B-B14F-4D97-AF65-F5344CB8AC3E}">
-        <p14:creationId xmlns:p14="http://schemas.microsoft.com/office/powerpoint/2010/main" val="648386472"/>
-      </p:ext>
-    </p:extLst>
   </p:cSld>
   <p:clrMapOvr>
     <a:masterClrMapping/>
@@ -4403,13 +4332,7 @@
       </p:grpSpPr>
       <p:sp>
         <p:nvSpPr>
-          <p:cNvPr id="3" name="Content Placeholder 2">
-            <a:extLst>
-              <a:ext uri="{FF2B5EF4-FFF2-40B4-BE49-F238E27FC236}">
-                <a16:creationId xmlns:a16="http://schemas.microsoft.com/office/drawing/2014/main" id="{383E536C-DCAE-4F28-8965-1219D8207440}"/>
-              </a:ext>
-            </a:extLst>
-          </p:cNvPr>
+          <p:cNvPr id="3" name="Content Placeholder 2"/>
           <p:cNvSpPr>
             <a:spLocks noGrp="1"/>
           </p:cNvSpPr>
@@ -4434,6 +4357,7 @@
               <a:rPr lang="en-IN" dirty="0"/>
               <a:t>This algorithm will search for all the recipes in the database that contain the ingredients input by the user.</a:t>
             </a:r>
+            <a:endParaRPr lang="en-IN" dirty="0"/>
           </a:p>
           <a:p>
             <a:pPr algn="l"/>
@@ -4441,6 +4365,7 @@
               <a:rPr lang="en-IN" dirty="0"/>
               <a:t>After filtering out the recipes, another algorithm will run, that will display the filtered recipes in such a way that recipes displayed  at top will contain all the ingredients that are input by the user and recipes at bottom will contain some extra and not easily available ingredients also.</a:t>
             </a:r>
+            <a:endParaRPr lang="en-IN" dirty="0"/>
           </a:p>
           <a:p>
             <a:pPr algn="l"/>
@@ -4448,6 +4373,7 @@
               <a:rPr lang="en-IN" dirty="0"/>
               <a:t>There will be 2 types of users and 1 administrator.</a:t>
             </a:r>
+            <a:endParaRPr lang="en-IN" dirty="0"/>
           </a:p>
           <a:p>
             <a:pPr algn="l"/>
@@ -4455,6 +4381,7 @@
               <a:rPr lang="en-IN" dirty="0"/>
               <a:t>Types of Users - </a:t>
             </a:r>
+            <a:endParaRPr lang="en-IN" dirty="0"/>
           </a:p>
           <a:p>
             <a:pPr algn="l"/>
@@ -4462,6 +4389,7 @@
               <a:rPr lang="en-IN" dirty="0"/>
               <a:t>1) Registered Users</a:t>
             </a:r>
+            <a:endParaRPr lang="en-IN" dirty="0"/>
           </a:p>
           <a:p>
             <a:pPr algn="l"/>
@@ -4469,15 +4397,11 @@
               <a:rPr lang="en-IN" dirty="0"/>
               <a:t>2) Unregistered Users.</a:t>
             </a:r>
+            <a:endParaRPr lang="en-IN" dirty="0"/>
           </a:p>
         </p:txBody>
       </p:sp>
     </p:spTree>
-    <p:extLst>
-      <p:ext uri="{BB962C8B-B14F-4D97-AF65-F5344CB8AC3E}">
-        <p14:creationId xmlns:p14="http://schemas.microsoft.com/office/powerpoint/2010/main" val="264387441"/>
-      </p:ext>
-    </p:extLst>
   </p:cSld>
   <p:clrMapOvr>
     <a:masterClrMapping/>
@@ -4504,13 +4428,7 @@
       </p:grpSpPr>
       <p:sp>
         <p:nvSpPr>
-          <p:cNvPr id="3" name="Content Placeholder 2">
-            <a:extLst>
-              <a:ext uri="{FF2B5EF4-FFF2-40B4-BE49-F238E27FC236}">
-                <a16:creationId xmlns:a16="http://schemas.microsoft.com/office/drawing/2014/main" id="{A6F3E2F3-7BF8-4525-9437-D7F67482A20F}"/>
-              </a:ext>
-            </a:extLst>
-          </p:cNvPr>
+          <p:cNvPr id="3" name="Content Placeholder 2"/>
           <p:cNvSpPr>
             <a:spLocks noGrp="1"/>
           </p:cNvSpPr>
@@ -4535,6 +4453,7 @@
               <a:rPr lang="en-IN" dirty="0"/>
               <a:t>For registering, user will have to fill up a signup form.</a:t>
             </a:r>
+            <a:endParaRPr lang="en-IN" dirty="0"/>
           </a:p>
           <a:p>
             <a:pPr algn="l"/>
@@ -4542,6 +4461,7 @@
               <a:rPr lang="en-IN" dirty="0"/>
               <a:t>Registered users will be able to upload their own recipes as well, on the portal for others to view and will also be able to give reviews.</a:t>
             </a:r>
+            <a:endParaRPr lang="en-IN" dirty="0"/>
           </a:p>
           <a:p>
             <a:pPr algn="l"/>
@@ -4549,6 +4469,7 @@
               <a:rPr lang="en-IN" dirty="0"/>
               <a:t>Unregistered users will visit the website and search for recipes. They wont be able to upload their own recipes. If they want to give their reviews, they will have to signup.</a:t>
             </a:r>
+            <a:endParaRPr lang="en-IN" dirty="0"/>
           </a:p>
           <a:p>
             <a:pPr algn="l"/>
@@ -4556,6 +4477,7 @@
               <a:rPr lang="en-IN" dirty="0"/>
               <a:t>Administrator will have to be authenticated while logging in.</a:t>
             </a:r>
+            <a:endParaRPr lang="en-IN" dirty="0"/>
           </a:p>
           <a:p>
             <a:pPr algn="l"/>
@@ -4563,6 +4485,7 @@
               <a:rPr lang="en-IN" dirty="0"/>
               <a:t>Administrator will have rights to upload new recipes and update old recipes.</a:t>
             </a:r>
+            <a:endParaRPr lang="en-IN" dirty="0"/>
           </a:p>
           <a:p>
             <a:pPr algn="l"/>
@@ -4570,18 +4493,14 @@
               <a:rPr lang="en-IN" dirty="0"/>
               <a:t>Administrator will have rights to take down plagiarised recipes.</a:t>
             </a:r>
-          </a:p>
-          <a:p>
             <a:endParaRPr lang="en-IN" dirty="0"/>
           </a:p>
+          <a:p>
+            <a:endParaRPr lang="en-IN" dirty="0"/>
+          </a:p>
         </p:txBody>
       </p:sp>
     </p:spTree>
-    <p:extLst>
-      <p:ext uri="{BB962C8B-B14F-4D97-AF65-F5344CB8AC3E}">
-        <p14:creationId xmlns:p14="http://schemas.microsoft.com/office/powerpoint/2010/main" val="1930218174"/>
-      </p:ext>
-    </p:extLst>
   </p:cSld>
   <p:clrMapOvr>
     <a:masterClrMapping/>
@@ -4608,13 +4527,7 @@
       </p:grpSpPr>
       <p:sp>
         <p:nvSpPr>
-          <p:cNvPr id="5" name="Rectangle 4">
-            <a:extLst>
-              <a:ext uri="{FF2B5EF4-FFF2-40B4-BE49-F238E27FC236}">
-                <a16:creationId xmlns:a16="http://schemas.microsoft.com/office/drawing/2014/main" id="{679304EE-1C6B-4B27-81EA-6A17BF87E260}"/>
-              </a:ext>
-            </a:extLst>
-          </p:cNvPr>
+          <p:cNvPr id="5" name="Rectangle 4"/>
           <p:cNvSpPr/>
           <p:nvPr/>
         </p:nvSpPr>
@@ -4674,13 +4587,7 @@
       </p:sp>
       <p:sp>
         <p:nvSpPr>
-          <p:cNvPr id="2" name="Title 1">
-            <a:extLst>
-              <a:ext uri="{FF2B5EF4-FFF2-40B4-BE49-F238E27FC236}">
-                <a16:creationId xmlns:a16="http://schemas.microsoft.com/office/drawing/2014/main" id="{4D2FEA66-0BE1-4D1E-9CD8-49F00E761AF1}"/>
-              </a:ext>
-            </a:extLst>
-          </p:cNvPr>
+          <p:cNvPr id="2" name="Title 1"/>
           <p:cNvSpPr>
             <a:spLocks noGrp="1"/>
           </p:cNvSpPr>
@@ -4711,18 +4618,13 @@
               <a:rPr lang="en-IN" dirty="0"/>
               <a:t> </a:t>
             </a:r>
-          </a:p>
-        </p:txBody>
-      </p:sp>
-      <p:sp>
-        <p:nvSpPr>
-          <p:cNvPr id="3" name="Content Placeholder 2">
-            <a:extLst>
-              <a:ext uri="{FF2B5EF4-FFF2-40B4-BE49-F238E27FC236}">
-                <a16:creationId xmlns:a16="http://schemas.microsoft.com/office/drawing/2014/main" id="{685F2F5D-1F5B-4525-9244-828643B18559}"/>
-              </a:ext>
-            </a:extLst>
-          </p:cNvPr>
+            <a:endParaRPr lang="en-IN" dirty="0"/>
+          </a:p>
+        </p:txBody>
+      </p:sp>
+      <p:sp>
+        <p:nvSpPr>
+          <p:cNvPr id="3" name="Content Placeholder 2"/>
           <p:cNvSpPr>
             <a:spLocks noGrp="1"/>
           </p:cNvSpPr>
@@ -4744,33 +4646,32 @@
               <a:rPr lang="en-IN" dirty="0"/>
               <a:t>HTML</a:t>
             </a:r>
+            <a:endParaRPr lang="en-IN" dirty="0"/>
           </a:p>
           <a:p>
             <a:r>
               <a:rPr lang="en-IN" dirty="0"/>
               <a:t>CSS</a:t>
             </a:r>
+            <a:endParaRPr lang="en-IN" dirty="0"/>
           </a:p>
           <a:p>
             <a:r>
               <a:rPr lang="en-IN" dirty="0"/>
               <a:t>JAVA SCRIPT</a:t>
             </a:r>
+            <a:endParaRPr lang="en-IN" dirty="0"/>
           </a:p>
           <a:p>
             <a:r>
               <a:rPr lang="en-IN" dirty="0"/>
               <a:t>BOOTSTRAP</a:t>
             </a:r>
+            <a:endParaRPr lang="en-IN" dirty="0"/>
           </a:p>
         </p:txBody>
       </p:sp>
     </p:spTree>
-    <p:extLst>
-      <p:ext uri="{BB962C8B-B14F-4D97-AF65-F5344CB8AC3E}">
-        <p14:creationId xmlns:p14="http://schemas.microsoft.com/office/powerpoint/2010/main" val="1043486642"/>
-      </p:ext>
-    </p:extLst>
   </p:cSld>
   <p:clrMapOvr>
     <a:masterClrMapping/>
@@ -4797,13 +4698,7 @@
       </p:grpSpPr>
       <p:sp>
         <p:nvSpPr>
-          <p:cNvPr id="5" name="Rectangle 4">
-            <a:extLst>
-              <a:ext uri="{FF2B5EF4-FFF2-40B4-BE49-F238E27FC236}">
-                <a16:creationId xmlns:a16="http://schemas.microsoft.com/office/drawing/2014/main" id="{D5407059-48B7-4FC4-A1FF-DC35AD4B622B}"/>
-              </a:ext>
-            </a:extLst>
-          </p:cNvPr>
+          <p:cNvPr id="5" name="Rectangle 4"/>
           <p:cNvSpPr/>
           <p:nvPr/>
         </p:nvSpPr>
@@ -4863,13 +4758,7 @@
       </p:sp>
       <p:sp>
         <p:nvSpPr>
-          <p:cNvPr id="2" name="Title 1">
-            <a:extLst>
-              <a:ext uri="{FF2B5EF4-FFF2-40B4-BE49-F238E27FC236}">
-                <a16:creationId xmlns:a16="http://schemas.microsoft.com/office/drawing/2014/main" id="{B1BF5C96-A9B6-4250-BF54-EA5D49B91300}"/>
-              </a:ext>
-            </a:extLst>
-          </p:cNvPr>
+          <p:cNvPr id="2" name="Title 1"/>
           <p:cNvSpPr>
             <a:spLocks noGrp="1"/>
           </p:cNvSpPr>
@@ -4904,18 +4793,25 @@
               </a:rPr>
               <a:t>Backend</a:t>
             </a:r>
-          </a:p>
-        </p:txBody>
-      </p:sp>
-      <p:sp>
-        <p:nvSpPr>
-          <p:cNvPr id="3" name="Content Placeholder 2">
-            <a:extLst>
-              <a:ext uri="{FF2B5EF4-FFF2-40B4-BE49-F238E27FC236}">
-                <a16:creationId xmlns:a16="http://schemas.microsoft.com/office/drawing/2014/main" id="{245EDA3C-E6FB-4266-B59C-88A50B618287}"/>
-              </a:ext>
-            </a:extLst>
-          </p:cNvPr>
+            <a:endParaRPr lang="en-IN" dirty="0">
+              <a:ln w="0"/>
+              <a:solidFill>
+                <a:srgbClr val="C00000"/>
+              </a:solidFill>
+              <a:effectLst>
+                <a:outerShdw blurRad="38100" dist="19050" dir="2700000" algn="tl" rotWithShape="0">
+                  <a:schemeClr val="dk1">
+                    <a:alpha val="40000"/>
+                  </a:schemeClr>
+                </a:outerShdw>
+              </a:effectLst>
+            </a:endParaRPr>
+          </a:p>
+        </p:txBody>
+      </p:sp>
+      <p:sp>
+        <p:nvSpPr>
+          <p:cNvPr id="3" name="Content Placeholder 2"/>
           <p:cNvSpPr>
             <a:spLocks noGrp="1"/>
           </p:cNvSpPr>
@@ -4932,24 +4828,21 @@
               <a:rPr lang="en-IN" dirty="0"/>
               <a:t>SQL</a:t>
             </a:r>
+            <a:endParaRPr lang="en-IN" dirty="0"/>
           </a:p>
           <a:p>
             <a:r>
               <a:rPr lang="en-IN" dirty="0"/>
               <a:t>NODE.JS</a:t>
             </a:r>
-          </a:p>
-          <a:p>
             <a:endParaRPr lang="en-IN" dirty="0"/>
           </a:p>
+          <a:p>
+            <a:endParaRPr lang="en-IN" dirty="0"/>
+          </a:p>
         </p:txBody>
       </p:sp>
     </p:spTree>
-    <p:extLst>
-      <p:ext uri="{BB962C8B-B14F-4D97-AF65-F5344CB8AC3E}">
-        <p14:creationId xmlns:p14="http://schemas.microsoft.com/office/powerpoint/2010/main" val="4126525615"/>
-      </p:ext>
-    </p:extLst>
   </p:cSld>
   <p:clrMapOvr>
     <a:masterClrMapping/>
@@ -4976,13 +4869,7 @@
       </p:grpSpPr>
       <p:sp>
         <p:nvSpPr>
-          <p:cNvPr id="4" name="Rectangle 3">
-            <a:extLst>
-              <a:ext uri="{FF2B5EF4-FFF2-40B4-BE49-F238E27FC236}">
-                <a16:creationId xmlns:a16="http://schemas.microsoft.com/office/drawing/2014/main" id="{A4B6B206-4D1B-4651-81C5-10340A29BDE5}"/>
-              </a:ext>
-            </a:extLst>
-          </p:cNvPr>
+          <p:cNvPr id="4" name="Rectangle 3"/>
           <p:cNvSpPr/>
           <p:nvPr/>
         </p:nvSpPr>
@@ -5030,13 +4917,7 @@
       </p:sp>
       <p:sp>
         <p:nvSpPr>
-          <p:cNvPr id="2" name="Title 1">
-            <a:extLst>
-              <a:ext uri="{FF2B5EF4-FFF2-40B4-BE49-F238E27FC236}">
-                <a16:creationId xmlns:a16="http://schemas.microsoft.com/office/drawing/2014/main" id="{8168B5B2-5447-4228-84F8-999A20D43055}"/>
-              </a:ext>
-            </a:extLst>
-          </p:cNvPr>
+          <p:cNvPr id="2" name="Title 1"/>
           <p:cNvSpPr>
             <a:spLocks noGrp="1"/>
           </p:cNvSpPr>
@@ -5076,18 +4957,25 @@
               </a:rPr>
               <a:t>Modular Design</a:t>
             </a:r>
-          </a:p>
-        </p:txBody>
-      </p:sp>
-      <p:sp>
-        <p:nvSpPr>
-          <p:cNvPr id="3" name="Content Placeholder 2">
-            <a:extLst>
-              <a:ext uri="{FF2B5EF4-FFF2-40B4-BE49-F238E27FC236}">
-                <a16:creationId xmlns:a16="http://schemas.microsoft.com/office/drawing/2014/main" id="{F2EE0396-6B67-4518-A9DD-B6C5E0F4F814}"/>
-              </a:ext>
-            </a:extLst>
-          </p:cNvPr>
+            <a:endParaRPr lang="en-IN" sz="4400" dirty="0">
+              <a:ln w="0"/>
+              <a:solidFill>
+                <a:srgbClr val="C00000"/>
+              </a:solidFill>
+              <a:effectLst>
+                <a:outerShdw blurRad="38100" dist="19050" dir="2700000" algn="tl" rotWithShape="0">
+                  <a:schemeClr val="dk1">
+                    <a:alpha val="40000"/>
+                  </a:schemeClr>
+                </a:outerShdw>
+              </a:effectLst>
+            </a:endParaRPr>
+          </a:p>
+        </p:txBody>
+      </p:sp>
+      <p:sp>
+        <p:nvSpPr>
+          <p:cNvPr id="3" name="Content Placeholder 2"/>
           <p:cNvSpPr>
             <a:spLocks noGrp="1"/>
           </p:cNvSpPr>
@@ -5116,6 +5004,7 @@
               <a:rPr lang="en-IN" sz="3200" dirty="0"/>
               <a:t>- Home page will display most popular and viewed recipes.</a:t>
             </a:r>
+            <a:endParaRPr lang="en-IN" sz="3200" dirty="0"/>
           </a:p>
           <a:p>
             <a:pPr algn="l"/>
@@ -5139,6 +5028,7 @@
               <a:rPr lang="en-IN" sz="3200" dirty="0"/>
               <a:t>- Sign Up Page for new users who would like to upload their recipes and give reviews.</a:t>
             </a:r>
+            <a:endParaRPr lang="en-IN" sz="3200" dirty="0"/>
           </a:p>
           <a:p>
             <a:pPr algn="l"/>
@@ -5150,15 +5040,11 @@
               <a:rPr lang="en-IN" sz="3200" dirty="0"/>
               <a:t>- Sign In page for existing users to log in.</a:t>
             </a:r>
+            <a:endParaRPr lang="en-IN" sz="3200" dirty="0"/>
           </a:p>
         </p:txBody>
       </p:sp>
     </p:spTree>
-    <p:extLst>
-      <p:ext uri="{BB962C8B-B14F-4D97-AF65-F5344CB8AC3E}">
-        <p14:creationId xmlns:p14="http://schemas.microsoft.com/office/powerpoint/2010/main" val="2098955934"/>
-      </p:ext>
-    </p:extLst>
   </p:cSld>
   <p:clrMapOvr>
     <a:masterClrMapping/>
@@ -5185,13 +5071,7 @@
       </p:grpSpPr>
       <p:sp>
         <p:nvSpPr>
-          <p:cNvPr id="3" name="Content Placeholder 2">
-            <a:extLst>
-              <a:ext uri="{FF2B5EF4-FFF2-40B4-BE49-F238E27FC236}">
-                <a16:creationId xmlns:a16="http://schemas.microsoft.com/office/drawing/2014/main" id="{29E75968-2801-4E9E-9200-A0D635514516}"/>
-              </a:ext>
-            </a:extLst>
-          </p:cNvPr>
+          <p:cNvPr id="3" name="Content Placeholder 2"/>
           <p:cNvSpPr>
             <a:spLocks noGrp="1"/>
           </p:cNvSpPr>
@@ -5220,6 +5100,7 @@
               <a:rPr lang="en-IN" sz="3200" dirty="0"/>
               <a:t>- Recipe details page to view a particular recipe and to view instructions to cook . Comments and reviews that particular recipe will also be visible on this page.</a:t>
             </a:r>
+            <a:endParaRPr lang="en-IN" sz="3200" dirty="0"/>
           </a:p>
           <a:p>
             <a:pPr algn="l"/>
@@ -5231,6 +5112,7 @@
               <a:rPr lang="en-IN" sz="3200" dirty="0"/>
               <a:t>- Page with forms for posting new recipes by the registered users.</a:t>
             </a:r>
+            <a:endParaRPr lang="en-IN" sz="3200" dirty="0"/>
           </a:p>
           <a:p>
             <a:pPr algn="l"/>
@@ -5242,15 +5124,11 @@
               <a:rPr lang="en-IN" sz="3200" dirty="0"/>
               <a:t>- Admin page for editing the existing recipes and removing the plagiarised recipes and to add new recipes.</a:t>
             </a:r>
+            <a:endParaRPr lang="en-IN" sz="3200" dirty="0"/>
           </a:p>
         </p:txBody>
       </p:sp>
     </p:spTree>
-    <p:extLst>
-      <p:ext uri="{BB962C8B-B14F-4D97-AF65-F5344CB8AC3E}">
-        <p14:creationId xmlns:p14="http://schemas.microsoft.com/office/powerpoint/2010/main" val="829901223"/>
-      </p:ext>
-    </p:extLst>
   </p:cSld>
   <p:clrMapOvr>
     <a:masterClrMapping/>
@@ -5538,7 +5416,10 @@
       </a:bgFillStyleLst>
     </a:fmtScheme>
   </a:themeElements>
-  <a:objectDefaults/>
-  <a:extraClrSchemeLst/>
+  <a:extLst>
+    <a:ext uri="{05A4C25C-085E-4340-85A3-A5531E510DB2}">
+      <thm15:themeFamily xmlns:thm15="http://schemas.microsoft.com/office/thememl/2012/main" name="Office Theme" id="{62F939B6-93AF-4DB8-9C6B-D6C7DFDC589F}" vid="{4A3C46E8-61CC-4603-A589-7422A47A8E4A}"/>
+    </a:ext>
+  </a:extLst>
 </a:theme>
 </file>
</xml_diff>